<commit_message>
File 3 Add and Update
</commit_message>
<xml_diff>
--- a/js.pptx
+++ b/js.pptx
@@ -23,6 +23,8 @@
     <p:sldId id="271" r:id="rId17"/>
     <p:sldId id="272" r:id="rId18"/>
     <p:sldId id="273" r:id="rId19"/>
+    <p:sldId id="274" r:id="rId20"/>
+    <p:sldId id="275" r:id="rId21"/>
   </p:sldIdLst>
   <p:sldSz cx="12192000" cy="6858000"/>
   <p:notesSz cx="6858000" cy="9144000"/>
@@ -129,6 +131,2643 @@
 </p:presentation>
 </file>
 
+<file path=ppt/diagrams/colors1.xml><?xml version="1.0" encoding="utf-8"?>
+<dgm:colorsDef xmlns:dgm="http://schemas.openxmlformats.org/drawingml/2006/diagram" xmlns:a="http://schemas.openxmlformats.org/drawingml/2006/main" uniqueId="urn:microsoft.com/office/officeart/2005/8/colors/accent2_2">
+  <dgm:title val=""/>
+  <dgm:desc val=""/>
+  <dgm:catLst>
+    <dgm:cat type="accent2" pri="11200"/>
+  </dgm:catLst>
+  <dgm:styleLbl name="node0">
+    <dgm:fillClrLst meth="repeat">
+      <a:schemeClr val="accent2"/>
+    </dgm:fillClrLst>
+    <dgm:linClrLst meth="repeat">
+      <a:schemeClr val="lt1"/>
+    </dgm:linClrLst>
+    <dgm:effectClrLst/>
+    <dgm:txLinClrLst/>
+    <dgm:txFillClrLst/>
+    <dgm:txEffectClrLst/>
+  </dgm:styleLbl>
+  <dgm:styleLbl name="node1">
+    <dgm:fillClrLst meth="repeat">
+      <a:schemeClr val="accent2"/>
+    </dgm:fillClrLst>
+    <dgm:linClrLst meth="repeat">
+      <a:schemeClr val="lt1"/>
+    </dgm:linClrLst>
+    <dgm:effectClrLst/>
+    <dgm:txLinClrLst/>
+    <dgm:txFillClrLst/>
+    <dgm:txEffectClrLst/>
+  </dgm:styleLbl>
+  <dgm:styleLbl name="alignNode1">
+    <dgm:fillClrLst meth="repeat">
+      <a:schemeClr val="accent2"/>
+    </dgm:fillClrLst>
+    <dgm:linClrLst meth="repeat">
+      <a:schemeClr val="accent2"/>
+    </dgm:linClrLst>
+    <dgm:effectClrLst/>
+    <dgm:txLinClrLst/>
+    <dgm:txFillClrLst/>
+    <dgm:txEffectClrLst/>
+  </dgm:styleLbl>
+  <dgm:styleLbl name="lnNode1">
+    <dgm:fillClrLst meth="repeat">
+      <a:schemeClr val="accent2"/>
+    </dgm:fillClrLst>
+    <dgm:linClrLst meth="repeat">
+      <a:schemeClr val="lt1"/>
+    </dgm:linClrLst>
+    <dgm:effectClrLst/>
+    <dgm:txLinClrLst/>
+    <dgm:txFillClrLst/>
+    <dgm:txEffectClrLst/>
+  </dgm:styleLbl>
+  <dgm:styleLbl name="vennNode1">
+    <dgm:fillClrLst meth="repeat">
+      <a:schemeClr val="accent2">
+        <a:alpha val="50000"/>
+      </a:schemeClr>
+    </dgm:fillClrLst>
+    <dgm:linClrLst meth="repeat">
+      <a:schemeClr val="lt1"/>
+    </dgm:linClrLst>
+    <dgm:effectClrLst/>
+    <dgm:txLinClrLst/>
+    <dgm:txFillClrLst/>
+    <dgm:txEffectClrLst/>
+  </dgm:styleLbl>
+  <dgm:styleLbl name="node2">
+    <dgm:fillClrLst meth="repeat">
+      <a:schemeClr val="accent2"/>
+    </dgm:fillClrLst>
+    <dgm:linClrLst meth="repeat">
+      <a:schemeClr val="lt1"/>
+    </dgm:linClrLst>
+    <dgm:effectClrLst/>
+    <dgm:txLinClrLst/>
+    <dgm:txFillClrLst/>
+    <dgm:txEffectClrLst/>
+  </dgm:styleLbl>
+  <dgm:styleLbl name="node3">
+    <dgm:fillClrLst meth="repeat">
+      <a:schemeClr val="accent2"/>
+    </dgm:fillClrLst>
+    <dgm:linClrLst meth="repeat">
+      <a:schemeClr val="lt1"/>
+    </dgm:linClrLst>
+    <dgm:effectClrLst/>
+    <dgm:txLinClrLst/>
+    <dgm:txFillClrLst/>
+    <dgm:txEffectClrLst/>
+  </dgm:styleLbl>
+  <dgm:styleLbl name="node4">
+    <dgm:fillClrLst meth="repeat">
+      <a:schemeClr val="accent2"/>
+    </dgm:fillClrLst>
+    <dgm:linClrLst meth="repeat">
+      <a:schemeClr val="lt1"/>
+    </dgm:linClrLst>
+    <dgm:effectClrLst/>
+    <dgm:txLinClrLst/>
+    <dgm:txFillClrLst/>
+    <dgm:txEffectClrLst/>
+  </dgm:styleLbl>
+  <dgm:styleLbl name="fgImgPlace1">
+    <dgm:fillClrLst meth="repeat">
+      <a:schemeClr val="accent2">
+        <a:tint val="50000"/>
+      </a:schemeClr>
+    </dgm:fillClrLst>
+    <dgm:linClrLst meth="repeat">
+      <a:schemeClr val="lt1"/>
+    </dgm:linClrLst>
+    <dgm:effectClrLst/>
+    <dgm:txLinClrLst/>
+    <dgm:txFillClrLst meth="repeat">
+      <a:schemeClr val="lt1"/>
+    </dgm:txFillClrLst>
+    <dgm:txEffectClrLst/>
+  </dgm:styleLbl>
+  <dgm:styleLbl name="alignImgPlace1">
+    <dgm:fillClrLst meth="repeat">
+      <a:schemeClr val="accent2">
+        <a:tint val="50000"/>
+      </a:schemeClr>
+    </dgm:fillClrLst>
+    <dgm:linClrLst meth="repeat">
+      <a:schemeClr val="lt1"/>
+    </dgm:linClrLst>
+    <dgm:effectClrLst/>
+    <dgm:txLinClrLst/>
+    <dgm:txFillClrLst meth="repeat">
+      <a:schemeClr val="lt1"/>
+    </dgm:txFillClrLst>
+    <dgm:txEffectClrLst/>
+  </dgm:styleLbl>
+  <dgm:styleLbl name="bgImgPlace1">
+    <dgm:fillClrLst meth="repeat">
+      <a:schemeClr val="accent2">
+        <a:tint val="50000"/>
+      </a:schemeClr>
+    </dgm:fillClrLst>
+    <dgm:linClrLst meth="repeat">
+      <a:schemeClr val="lt1"/>
+    </dgm:linClrLst>
+    <dgm:effectClrLst/>
+    <dgm:txLinClrLst/>
+    <dgm:txFillClrLst meth="repeat">
+      <a:schemeClr val="lt1"/>
+    </dgm:txFillClrLst>
+    <dgm:txEffectClrLst/>
+  </dgm:styleLbl>
+  <dgm:styleLbl name="sibTrans2D1">
+    <dgm:fillClrLst meth="repeat">
+      <a:schemeClr val="accent2">
+        <a:tint val="60000"/>
+      </a:schemeClr>
+    </dgm:fillClrLst>
+    <dgm:linClrLst meth="repeat">
+      <a:schemeClr val="accent2">
+        <a:tint val="60000"/>
+      </a:schemeClr>
+    </dgm:linClrLst>
+    <dgm:effectClrLst/>
+    <dgm:txLinClrLst/>
+    <dgm:txFillClrLst/>
+    <dgm:txEffectClrLst/>
+  </dgm:styleLbl>
+  <dgm:styleLbl name="fgSibTrans2D1">
+    <dgm:fillClrLst meth="repeat">
+      <a:schemeClr val="accent2">
+        <a:tint val="60000"/>
+      </a:schemeClr>
+    </dgm:fillClrLst>
+    <dgm:linClrLst meth="repeat">
+      <a:schemeClr val="accent2">
+        <a:tint val="60000"/>
+      </a:schemeClr>
+    </dgm:linClrLst>
+    <dgm:effectClrLst/>
+    <dgm:txLinClrLst/>
+    <dgm:txFillClrLst/>
+    <dgm:txEffectClrLst/>
+  </dgm:styleLbl>
+  <dgm:styleLbl name="bgSibTrans2D1">
+    <dgm:fillClrLst meth="repeat">
+      <a:schemeClr val="accent2">
+        <a:tint val="60000"/>
+      </a:schemeClr>
+    </dgm:fillClrLst>
+    <dgm:linClrLst meth="repeat">
+      <a:schemeClr val="accent2">
+        <a:tint val="60000"/>
+      </a:schemeClr>
+    </dgm:linClrLst>
+    <dgm:effectClrLst/>
+    <dgm:txLinClrLst/>
+    <dgm:txFillClrLst/>
+    <dgm:txEffectClrLst/>
+  </dgm:styleLbl>
+  <dgm:styleLbl name="sibTrans1D1">
+    <dgm:fillClrLst meth="repeat">
+      <a:schemeClr val="accent2"/>
+    </dgm:fillClrLst>
+    <dgm:linClrLst meth="repeat">
+      <a:schemeClr val="accent2"/>
+    </dgm:linClrLst>
+    <dgm:effectClrLst/>
+    <dgm:txLinClrLst/>
+    <dgm:txFillClrLst meth="repeat">
+      <a:schemeClr val="tx1"/>
+    </dgm:txFillClrLst>
+    <dgm:txEffectClrLst/>
+  </dgm:styleLbl>
+  <dgm:styleLbl name="callout">
+    <dgm:fillClrLst meth="repeat">
+      <a:schemeClr val="accent2"/>
+    </dgm:fillClrLst>
+    <dgm:linClrLst meth="repeat">
+      <a:schemeClr val="accent2">
+        <a:tint val="50000"/>
+      </a:schemeClr>
+    </dgm:linClrLst>
+    <dgm:effectClrLst/>
+    <dgm:txLinClrLst/>
+    <dgm:txFillClrLst meth="repeat">
+      <a:schemeClr val="tx1"/>
+    </dgm:txFillClrLst>
+    <dgm:txEffectClrLst/>
+  </dgm:styleLbl>
+  <dgm:styleLbl name="asst0">
+    <dgm:fillClrLst meth="repeat">
+      <a:schemeClr val="accent2"/>
+    </dgm:fillClrLst>
+    <dgm:linClrLst meth="repeat">
+      <a:schemeClr val="lt1"/>
+    </dgm:linClrLst>
+    <dgm:effectClrLst/>
+    <dgm:txLinClrLst/>
+    <dgm:txFillClrLst/>
+    <dgm:txEffectClrLst/>
+  </dgm:styleLbl>
+  <dgm:styleLbl name="asst1">
+    <dgm:fillClrLst meth="repeat">
+      <a:schemeClr val="accent2"/>
+    </dgm:fillClrLst>
+    <dgm:linClrLst meth="repeat">
+      <a:schemeClr val="lt1"/>
+    </dgm:linClrLst>
+    <dgm:effectClrLst/>
+    <dgm:txLinClrLst/>
+    <dgm:txFillClrLst/>
+    <dgm:txEffectClrLst/>
+  </dgm:styleLbl>
+  <dgm:styleLbl name="asst2">
+    <dgm:fillClrLst meth="repeat">
+      <a:schemeClr val="accent2"/>
+    </dgm:fillClrLst>
+    <dgm:linClrLst meth="repeat">
+      <a:schemeClr val="lt1"/>
+    </dgm:linClrLst>
+    <dgm:effectClrLst/>
+    <dgm:txLinClrLst/>
+    <dgm:txFillClrLst/>
+    <dgm:txEffectClrLst/>
+  </dgm:styleLbl>
+  <dgm:styleLbl name="asst3">
+    <dgm:fillClrLst meth="repeat">
+      <a:schemeClr val="accent2"/>
+    </dgm:fillClrLst>
+    <dgm:linClrLst meth="repeat">
+      <a:schemeClr val="lt1"/>
+    </dgm:linClrLst>
+    <dgm:effectClrLst/>
+    <dgm:txLinClrLst/>
+    <dgm:txFillClrLst/>
+    <dgm:txEffectClrLst/>
+  </dgm:styleLbl>
+  <dgm:styleLbl name="asst4">
+    <dgm:fillClrLst meth="repeat">
+      <a:schemeClr val="accent2"/>
+    </dgm:fillClrLst>
+    <dgm:linClrLst meth="repeat">
+      <a:schemeClr val="lt1"/>
+    </dgm:linClrLst>
+    <dgm:effectClrLst/>
+    <dgm:txLinClrLst/>
+    <dgm:txFillClrLst/>
+    <dgm:txEffectClrLst/>
+  </dgm:styleLbl>
+  <dgm:styleLbl name="parChTrans2D1">
+    <dgm:fillClrLst meth="repeat">
+      <a:schemeClr val="accent2">
+        <a:tint val="60000"/>
+      </a:schemeClr>
+    </dgm:fillClrLst>
+    <dgm:linClrLst meth="repeat">
+      <a:schemeClr val="accent2">
+        <a:tint val="60000"/>
+      </a:schemeClr>
+    </dgm:linClrLst>
+    <dgm:effectClrLst/>
+    <dgm:txLinClrLst/>
+    <dgm:txFillClrLst meth="repeat">
+      <a:schemeClr val="lt1"/>
+    </dgm:txFillClrLst>
+    <dgm:txEffectClrLst/>
+  </dgm:styleLbl>
+  <dgm:styleLbl name="parChTrans2D2">
+    <dgm:fillClrLst meth="repeat">
+      <a:schemeClr val="accent2"/>
+    </dgm:fillClrLst>
+    <dgm:linClrLst meth="repeat">
+      <a:schemeClr val="accent2"/>
+    </dgm:linClrLst>
+    <dgm:effectClrLst/>
+    <dgm:txLinClrLst/>
+    <dgm:txFillClrLst meth="repeat">
+      <a:schemeClr val="lt1"/>
+    </dgm:txFillClrLst>
+    <dgm:txEffectClrLst/>
+  </dgm:styleLbl>
+  <dgm:styleLbl name="parChTrans2D3">
+    <dgm:fillClrLst meth="repeat">
+      <a:schemeClr val="accent2"/>
+    </dgm:fillClrLst>
+    <dgm:linClrLst meth="repeat">
+      <a:schemeClr val="accent2"/>
+    </dgm:linClrLst>
+    <dgm:effectClrLst/>
+    <dgm:txLinClrLst/>
+    <dgm:txFillClrLst meth="repeat">
+      <a:schemeClr val="lt1"/>
+    </dgm:txFillClrLst>
+    <dgm:txEffectClrLst/>
+  </dgm:styleLbl>
+  <dgm:styleLbl name="parChTrans2D4">
+    <dgm:fillClrLst meth="repeat">
+      <a:schemeClr val="accent2"/>
+    </dgm:fillClrLst>
+    <dgm:linClrLst meth="repeat">
+      <a:schemeClr val="accent2"/>
+    </dgm:linClrLst>
+    <dgm:effectClrLst/>
+    <dgm:txLinClrLst/>
+    <dgm:txFillClrLst meth="repeat">
+      <a:schemeClr val="lt1"/>
+    </dgm:txFillClrLst>
+    <dgm:txEffectClrLst/>
+  </dgm:styleLbl>
+  <dgm:styleLbl name="parChTrans1D1">
+    <dgm:fillClrLst meth="repeat">
+      <a:schemeClr val="accent2"/>
+    </dgm:fillClrLst>
+    <dgm:linClrLst meth="repeat">
+      <a:schemeClr val="accent2">
+        <a:shade val="60000"/>
+      </a:schemeClr>
+    </dgm:linClrLst>
+    <dgm:effectClrLst/>
+    <dgm:txLinClrLst/>
+    <dgm:txFillClrLst meth="repeat">
+      <a:schemeClr val="tx1"/>
+    </dgm:txFillClrLst>
+    <dgm:txEffectClrLst/>
+  </dgm:styleLbl>
+  <dgm:styleLbl name="parChTrans1D2">
+    <dgm:fillClrLst meth="repeat">
+      <a:schemeClr val="accent2"/>
+    </dgm:fillClrLst>
+    <dgm:linClrLst meth="repeat">
+      <a:schemeClr val="accent2">
+        <a:shade val="60000"/>
+      </a:schemeClr>
+    </dgm:linClrLst>
+    <dgm:effectClrLst/>
+    <dgm:txLinClrLst/>
+    <dgm:txFillClrLst meth="repeat">
+      <a:schemeClr val="tx1"/>
+    </dgm:txFillClrLst>
+    <dgm:txEffectClrLst/>
+  </dgm:styleLbl>
+  <dgm:styleLbl name="parChTrans1D3">
+    <dgm:fillClrLst meth="repeat">
+      <a:schemeClr val="accent2"/>
+    </dgm:fillClrLst>
+    <dgm:linClrLst meth="repeat">
+      <a:schemeClr val="accent2">
+        <a:shade val="80000"/>
+      </a:schemeClr>
+    </dgm:linClrLst>
+    <dgm:effectClrLst/>
+    <dgm:txLinClrLst/>
+    <dgm:txFillClrLst meth="repeat">
+      <a:schemeClr val="tx1"/>
+    </dgm:txFillClrLst>
+    <dgm:txEffectClrLst/>
+  </dgm:styleLbl>
+  <dgm:styleLbl name="parChTrans1D4">
+    <dgm:fillClrLst meth="repeat">
+      <a:schemeClr val="accent2"/>
+    </dgm:fillClrLst>
+    <dgm:linClrLst meth="repeat">
+      <a:schemeClr val="accent2">
+        <a:shade val="80000"/>
+      </a:schemeClr>
+    </dgm:linClrLst>
+    <dgm:effectClrLst/>
+    <dgm:txLinClrLst/>
+    <dgm:txFillClrLst meth="repeat">
+      <a:schemeClr val="tx1"/>
+    </dgm:txFillClrLst>
+    <dgm:txEffectClrLst/>
+  </dgm:styleLbl>
+  <dgm:styleLbl name="fgAcc1">
+    <dgm:fillClrLst meth="repeat">
+      <a:schemeClr val="lt1">
+        <a:alpha val="90000"/>
+      </a:schemeClr>
+    </dgm:fillClrLst>
+    <dgm:linClrLst meth="repeat">
+      <a:schemeClr val="accent2"/>
+    </dgm:linClrLst>
+    <dgm:effectClrLst/>
+    <dgm:txLinClrLst/>
+    <dgm:txFillClrLst meth="repeat">
+      <a:schemeClr val="dk1"/>
+    </dgm:txFillClrLst>
+    <dgm:txEffectClrLst/>
+  </dgm:styleLbl>
+  <dgm:styleLbl name="conFgAcc1">
+    <dgm:fillClrLst meth="repeat">
+      <a:schemeClr val="lt1">
+        <a:alpha val="90000"/>
+      </a:schemeClr>
+    </dgm:fillClrLst>
+    <dgm:linClrLst meth="repeat">
+      <a:schemeClr val="accent2"/>
+    </dgm:linClrLst>
+    <dgm:effectClrLst/>
+    <dgm:txLinClrLst/>
+    <dgm:txFillClrLst meth="repeat">
+      <a:schemeClr val="dk1"/>
+    </dgm:txFillClrLst>
+    <dgm:txEffectClrLst/>
+  </dgm:styleLbl>
+  <dgm:styleLbl name="alignAcc1">
+    <dgm:fillClrLst meth="repeat">
+      <a:schemeClr val="lt1">
+        <a:alpha val="90000"/>
+      </a:schemeClr>
+    </dgm:fillClrLst>
+    <dgm:linClrLst meth="repeat">
+      <a:schemeClr val="accent2"/>
+    </dgm:linClrLst>
+    <dgm:effectClrLst/>
+    <dgm:txLinClrLst/>
+    <dgm:txFillClrLst meth="repeat">
+      <a:schemeClr val="dk1"/>
+    </dgm:txFillClrLst>
+    <dgm:txEffectClrLst/>
+  </dgm:styleLbl>
+  <dgm:styleLbl name="trAlignAcc1">
+    <dgm:fillClrLst meth="repeat">
+      <a:schemeClr val="lt1">
+        <a:alpha val="40000"/>
+      </a:schemeClr>
+    </dgm:fillClrLst>
+    <dgm:linClrLst meth="repeat">
+      <a:schemeClr val="accent2"/>
+    </dgm:linClrLst>
+    <dgm:effectClrLst/>
+    <dgm:txLinClrLst/>
+    <dgm:txFillClrLst meth="repeat">
+      <a:schemeClr val="dk1"/>
+    </dgm:txFillClrLst>
+    <dgm:txEffectClrLst/>
+  </dgm:styleLbl>
+  <dgm:styleLbl name="bgAcc1">
+    <dgm:fillClrLst meth="repeat">
+      <a:schemeClr val="lt1">
+        <a:alpha val="90000"/>
+      </a:schemeClr>
+    </dgm:fillClrLst>
+    <dgm:linClrLst meth="repeat">
+      <a:schemeClr val="accent2"/>
+    </dgm:linClrLst>
+    <dgm:effectClrLst/>
+    <dgm:txLinClrLst/>
+    <dgm:txFillClrLst meth="repeat">
+      <a:schemeClr val="dk1"/>
+    </dgm:txFillClrLst>
+    <dgm:txEffectClrLst/>
+  </dgm:styleLbl>
+  <dgm:styleLbl name="solidFgAcc1">
+    <dgm:fillClrLst meth="repeat">
+      <a:schemeClr val="lt1"/>
+    </dgm:fillClrLst>
+    <dgm:linClrLst meth="repeat">
+      <a:schemeClr val="accent2"/>
+    </dgm:linClrLst>
+    <dgm:effectClrLst/>
+    <dgm:txLinClrLst/>
+    <dgm:txFillClrLst meth="repeat">
+      <a:schemeClr val="dk1"/>
+    </dgm:txFillClrLst>
+    <dgm:txEffectClrLst/>
+  </dgm:styleLbl>
+  <dgm:styleLbl name="solidAlignAcc1">
+    <dgm:fillClrLst meth="repeat">
+      <a:schemeClr val="lt1"/>
+    </dgm:fillClrLst>
+    <dgm:linClrLst meth="repeat">
+      <a:schemeClr val="accent2"/>
+    </dgm:linClrLst>
+    <dgm:effectClrLst/>
+    <dgm:txLinClrLst/>
+    <dgm:txFillClrLst meth="repeat">
+      <a:schemeClr val="dk1"/>
+    </dgm:txFillClrLst>
+    <dgm:txEffectClrLst/>
+  </dgm:styleLbl>
+  <dgm:styleLbl name="solidBgAcc1">
+    <dgm:fillClrLst meth="repeat">
+      <a:schemeClr val="lt1"/>
+    </dgm:fillClrLst>
+    <dgm:linClrLst meth="repeat">
+      <a:schemeClr val="accent2"/>
+    </dgm:linClrLst>
+    <dgm:effectClrLst/>
+    <dgm:txLinClrLst/>
+    <dgm:txFillClrLst meth="repeat">
+      <a:schemeClr val="dk1"/>
+    </dgm:txFillClrLst>
+    <dgm:txEffectClrLst/>
+  </dgm:styleLbl>
+  <dgm:styleLbl name="fgAccFollowNode1">
+    <dgm:fillClrLst meth="repeat">
+      <a:schemeClr val="accent2">
+        <a:alpha val="90000"/>
+        <a:tint val="40000"/>
+      </a:schemeClr>
+    </dgm:fillClrLst>
+    <dgm:linClrLst meth="repeat">
+      <a:schemeClr val="accent2">
+        <a:alpha val="90000"/>
+        <a:tint val="40000"/>
+      </a:schemeClr>
+    </dgm:linClrLst>
+    <dgm:effectClrLst/>
+    <dgm:txLinClrLst/>
+    <dgm:txFillClrLst meth="repeat">
+      <a:schemeClr val="dk1"/>
+    </dgm:txFillClrLst>
+    <dgm:txEffectClrLst/>
+  </dgm:styleLbl>
+  <dgm:styleLbl name="alignAccFollowNode1">
+    <dgm:fillClrLst meth="repeat">
+      <a:schemeClr val="accent2">
+        <a:alpha val="90000"/>
+        <a:tint val="40000"/>
+      </a:schemeClr>
+    </dgm:fillClrLst>
+    <dgm:linClrLst meth="repeat">
+      <a:schemeClr val="accent2">
+        <a:alpha val="90000"/>
+        <a:tint val="40000"/>
+      </a:schemeClr>
+    </dgm:linClrLst>
+    <dgm:effectClrLst/>
+    <dgm:txLinClrLst/>
+    <dgm:txFillClrLst meth="repeat">
+      <a:schemeClr val="dk1"/>
+    </dgm:txFillClrLst>
+    <dgm:txEffectClrLst/>
+  </dgm:styleLbl>
+  <dgm:styleLbl name="bgAccFollowNode1">
+    <dgm:fillClrLst meth="repeat">
+      <a:schemeClr val="accent2">
+        <a:alpha val="90000"/>
+        <a:tint val="40000"/>
+      </a:schemeClr>
+    </dgm:fillClrLst>
+    <dgm:linClrLst meth="repeat">
+      <a:schemeClr val="accent2">
+        <a:alpha val="90000"/>
+        <a:tint val="40000"/>
+      </a:schemeClr>
+    </dgm:linClrLst>
+    <dgm:effectClrLst/>
+    <dgm:txLinClrLst/>
+    <dgm:txFillClrLst meth="repeat">
+      <a:schemeClr val="dk1"/>
+    </dgm:txFillClrLst>
+    <dgm:txEffectClrLst/>
+  </dgm:styleLbl>
+  <dgm:styleLbl name="fgAcc0">
+    <dgm:fillClrLst meth="repeat">
+      <a:schemeClr val="lt1">
+        <a:alpha val="90000"/>
+      </a:schemeClr>
+    </dgm:fillClrLst>
+    <dgm:linClrLst meth="repeat">
+      <a:schemeClr val="accent2"/>
+    </dgm:linClrLst>
+    <dgm:effectClrLst/>
+    <dgm:txLinClrLst/>
+    <dgm:txFillClrLst meth="repeat">
+      <a:schemeClr val="dk1"/>
+    </dgm:txFillClrLst>
+    <dgm:txEffectClrLst/>
+  </dgm:styleLbl>
+  <dgm:styleLbl name="fgAcc2">
+    <dgm:fillClrLst meth="repeat">
+      <a:schemeClr val="lt1">
+        <a:alpha val="90000"/>
+      </a:schemeClr>
+    </dgm:fillClrLst>
+    <dgm:linClrLst meth="repeat">
+      <a:schemeClr val="accent2"/>
+    </dgm:linClrLst>
+    <dgm:effectClrLst/>
+    <dgm:txLinClrLst/>
+    <dgm:txFillClrLst meth="repeat">
+      <a:schemeClr val="dk1"/>
+    </dgm:txFillClrLst>
+    <dgm:txEffectClrLst/>
+  </dgm:styleLbl>
+  <dgm:styleLbl name="fgAcc3">
+    <dgm:fillClrLst meth="repeat">
+      <a:schemeClr val="lt1">
+        <a:alpha val="90000"/>
+      </a:schemeClr>
+    </dgm:fillClrLst>
+    <dgm:linClrLst meth="repeat">
+      <a:schemeClr val="accent2"/>
+    </dgm:linClrLst>
+    <dgm:effectClrLst/>
+    <dgm:txLinClrLst/>
+    <dgm:txFillClrLst meth="repeat">
+      <a:schemeClr val="dk1"/>
+    </dgm:txFillClrLst>
+    <dgm:txEffectClrLst/>
+  </dgm:styleLbl>
+  <dgm:styleLbl name="fgAcc4">
+    <dgm:fillClrLst meth="repeat">
+      <a:schemeClr val="lt1">
+        <a:alpha val="90000"/>
+      </a:schemeClr>
+    </dgm:fillClrLst>
+    <dgm:linClrLst meth="repeat">
+      <a:schemeClr val="accent2"/>
+    </dgm:linClrLst>
+    <dgm:effectClrLst/>
+    <dgm:txLinClrLst/>
+    <dgm:txFillClrLst meth="repeat">
+      <a:schemeClr val="dk1"/>
+    </dgm:txFillClrLst>
+    <dgm:txEffectClrLst/>
+  </dgm:styleLbl>
+  <dgm:styleLbl name="bgShp">
+    <dgm:fillClrLst meth="repeat">
+      <a:schemeClr val="accent2">
+        <a:tint val="40000"/>
+      </a:schemeClr>
+    </dgm:fillClrLst>
+    <dgm:linClrLst meth="repeat">
+      <a:schemeClr val="accent2"/>
+    </dgm:linClrLst>
+    <dgm:effectClrLst/>
+    <dgm:txLinClrLst/>
+    <dgm:txFillClrLst meth="repeat">
+      <a:schemeClr val="dk1"/>
+    </dgm:txFillClrLst>
+    <dgm:txEffectClrLst/>
+  </dgm:styleLbl>
+  <dgm:styleLbl name="dkBgShp">
+    <dgm:fillClrLst meth="repeat">
+      <a:schemeClr val="accent2">
+        <a:shade val="80000"/>
+      </a:schemeClr>
+    </dgm:fillClrLst>
+    <dgm:linClrLst meth="repeat">
+      <a:schemeClr val="accent2"/>
+    </dgm:linClrLst>
+    <dgm:effectClrLst/>
+    <dgm:txLinClrLst/>
+    <dgm:txFillClrLst meth="repeat">
+      <a:schemeClr val="lt1"/>
+    </dgm:txFillClrLst>
+    <dgm:txEffectClrLst/>
+  </dgm:styleLbl>
+  <dgm:styleLbl name="trBgShp">
+    <dgm:fillClrLst meth="repeat">
+      <a:schemeClr val="accent2">
+        <a:tint val="50000"/>
+        <a:alpha val="40000"/>
+      </a:schemeClr>
+    </dgm:fillClrLst>
+    <dgm:linClrLst meth="repeat">
+      <a:schemeClr val="accent2"/>
+    </dgm:linClrLst>
+    <dgm:effectClrLst/>
+    <dgm:txLinClrLst/>
+    <dgm:txFillClrLst meth="repeat">
+      <a:schemeClr val="lt1"/>
+    </dgm:txFillClrLst>
+    <dgm:txEffectClrLst/>
+  </dgm:styleLbl>
+  <dgm:styleLbl name="fgShp">
+    <dgm:fillClrLst meth="repeat">
+      <a:schemeClr val="accent2">
+        <a:tint val="60000"/>
+      </a:schemeClr>
+    </dgm:fillClrLst>
+    <dgm:linClrLst meth="repeat">
+      <a:schemeClr val="lt1"/>
+    </dgm:linClrLst>
+    <dgm:effectClrLst/>
+    <dgm:txLinClrLst/>
+    <dgm:txFillClrLst meth="repeat">
+      <a:schemeClr val="dk1"/>
+    </dgm:txFillClrLst>
+    <dgm:txEffectClrLst/>
+  </dgm:styleLbl>
+  <dgm:styleLbl name="revTx">
+    <dgm:fillClrLst meth="repeat">
+      <a:schemeClr val="lt1">
+        <a:alpha val="0"/>
+      </a:schemeClr>
+    </dgm:fillClrLst>
+    <dgm:linClrLst meth="repeat">
+      <a:schemeClr val="dk1">
+        <a:alpha val="0"/>
+      </a:schemeClr>
+    </dgm:linClrLst>
+    <dgm:effectClrLst/>
+    <dgm:txLinClrLst/>
+    <dgm:txFillClrLst meth="repeat">
+      <a:schemeClr val="tx1"/>
+    </dgm:txFillClrLst>
+    <dgm:txEffectClrLst/>
+  </dgm:styleLbl>
+</dgm:colorsDef>
+</file>
+
+<file path=ppt/diagrams/data1.xml><?xml version="1.0" encoding="utf-8"?>
+<dgm:dataModel xmlns:dgm="http://schemas.openxmlformats.org/drawingml/2006/diagram" xmlns:a="http://schemas.openxmlformats.org/drawingml/2006/main">
+  <dgm:ptLst>
+    <dgm:pt modelId="{3EADE527-C8BF-4C29-A3EE-C4A7C6C84A77}" type="doc">
+      <dgm:prSet loTypeId="urn:microsoft.com/office/officeart/2005/8/layout/cycle1" loCatId="cycle" qsTypeId="urn:microsoft.com/office/officeart/2005/8/quickstyle/simple5" qsCatId="simple" csTypeId="urn:microsoft.com/office/officeart/2005/8/colors/accent2_2" csCatId="accent2" phldr="1"/>
+      <dgm:spPr/>
+      <dgm:t>
+        <a:bodyPr/>
+        <a:lstStyle/>
+        <a:p>
+          <a:endParaRPr lang="en-IN"/>
+        </a:p>
+      </dgm:t>
+    </dgm:pt>
+    <dgm:pt modelId="{ABCB9C71-6CBB-4802-BD56-E7703ECBB05E}">
+      <dgm:prSet phldrT="[Text]"/>
+      <dgm:spPr/>
+      <dgm:t>
+        <a:bodyPr/>
+        <a:lstStyle/>
+        <a:p>
+          <a:r>
+            <a:rPr lang="en-US" dirty="0"/>
+            <a:t>Event</a:t>
+          </a:r>
+          <a:endParaRPr lang="en-IN" dirty="0"/>
+        </a:p>
+      </dgm:t>
+    </dgm:pt>
+    <dgm:pt modelId="{0B6617B5-7020-4938-A375-54D44CF32FD1}" type="parTrans" cxnId="{2214875C-8E30-4940-936A-8125BB437805}">
+      <dgm:prSet/>
+      <dgm:spPr/>
+      <dgm:t>
+        <a:bodyPr/>
+        <a:lstStyle/>
+        <a:p>
+          <a:endParaRPr lang="en-IN"/>
+        </a:p>
+      </dgm:t>
+    </dgm:pt>
+    <dgm:pt modelId="{C4171DD6-2CE2-4A27-9993-941C3691DC2D}" type="sibTrans" cxnId="{2214875C-8E30-4940-936A-8125BB437805}">
+      <dgm:prSet/>
+      <dgm:spPr/>
+      <dgm:t>
+        <a:bodyPr/>
+        <a:lstStyle/>
+        <a:p>
+          <a:endParaRPr lang="en-IN"/>
+        </a:p>
+      </dgm:t>
+    </dgm:pt>
+    <dgm:pt modelId="{59A18F8B-8DDC-409A-992A-8939DC56FA19}">
+      <dgm:prSet phldrT="[Text]"/>
+      <dgm:spPr/>
+      <dgm:t>
+        <a:bodyPr/>
+        <a:lstStyle/>
+        <a:p>
+          <a:r>
+            <a:rPr lang="en-US" dirty="0"/>
+            <a:t>Loop</a:t>
+          </a:r>
+          <a:endParaRPr lang="en-IN" dirty="0"/>
+        </a:p>
+      </dgm:t>
+    </dgm:pt>
+    <dgm:pt modelId="{AAEB6786-0C3D-49CF-80F2-5A8FFA7814C0}" type="parTrans" cxnId="{A894C173-FAB9-4CC5-BC34-EE6EDCDB1E9B}">
+      <dgm:prSet/>
+      <dgm:spPr/>
+      <dgm:t>
+        <a:bodyPr/>
+        <a:lstStyle/>
+        <a:p>
+          <a:endParaRPr lang="en-IN"/>
+        </a:p>
+      </dgm:t>
+    </dgm:pt>
+    <dgm:pt modelId="{9FDA4F96-5E32-4061-ABFF-9797B27CD0A4}" type="sibTrans" cxnId="{A894C173-FAB9-4CC5-BC34-EE6EDCDB1E9B}">
+      <dgm:prSet/>
+      <dgm:spPr/>
+      <dgm:t>
+        <a:bodyPr/>
+        <a:lstStyle/>
+        <a:p>
+          <a:endParaRPr lang="en-IN"/>
+        </a:p>
+      </dgm:t>
+    </dgm:pt>
+    <dgm:pt modelId="{41BAC26F-4A6E-46F4-B068-6FB2D097BD35}">
+      <dgm:prSet phldrT="[Text]"/>
+      <dgm:spPr/>
+      <dgm:t>
+        <a:bodyPr/>
+        <a:lstStyle/>
+        <a:p>
+          <a:r>
+            <a:rPr lang="en-US" dirty="0"/>
+            <a:t>An</a:t>
+          </a:r>
+          <a:endParaRPr lang="en-IN" dirty="0"/>
+        </a:p>
+      </dgm:t>
+    </dgm:pt>
+    <dgm:pt modelId="{9A9692BC-F13E-4E6F-96EA-36132F4CF07A}" type="parTrans" cxnId="{BFAA26DA-1E0B-4E5F-AAED-D7D3D224BB02}">
+      <dgm:prSet/>
+      <dgm:spPr/>
+      <dgm:t>
+        <a:bodyPr/>
+        <a:lstStyle/>
+        <a:p>
+          <a:endParaRPr lang="en-IN"/>
+        </a:p>
+      </dgm:t>
+    </dgm:pt>
+    <dgm:pt modelId="{C3DBBE8D-F1C7-4171-9D53-AD6851916DFB}" type="sibTrans" cxnId="{BFAA26DA-1E0B-4E5F-AAED-D7D3D224BB02}">
+      <dgm:prSet/>
+      <dgm:spPr/>
+      <dgm:t>
+        <a:bodyPr/>
+        <a:lstStyle/>
+        <a:p>
+          <a:endParaRPr lang="en-IN"/>
+        </a:p>
+      </dgm:t>
+    </dgm:pt>
+    <dgm:pt modelId="{6386276D-3BC8-4495-9AEC-DDFA1A6DE38D}" type="pres">
+      <dgm:prSet presAssocID="{3EADE527-C8BF-4C29-A3EE-C4A7C6C84A77}" presName="cycle" presStyleCnt="0">
+        <dgm:presLayoutVars>
+          <dgm:dir/>
+          <dgm:resizeHandles val="exact"/>
+        </dgm:presLayoutVars>
+      </dgm:prSet>
+      <dgm:spPr/>
+    </dgm:pt>
+    <dgm:pt modelId="{95E2BECC-C9DF-45D6-BD8A-16128B82A92C}" type="pres">
+      <dgm:prSet presAssocID="{ABCB9C71-6CBB-4802-BD56-E7703ECBB05E}" presName="dummy" presStyleCnt="0"/>
+      <dgm:spPr/>
+    </dgm:pt>
+    <dgm:pt modelId="{E3A37E31-EBEE-4A4A-A109-C4C4401558E8}" type="pres">
+      <dgm:prSet presAssocID="{ABCB9C71-6CBB-4802-BD56-E7703ECBB05E}" presName="node" presStyleLbl="revTx" presStyleIdx="0" presStyleCnt="3">
+        <dgm:presLayoutVars>
+          <dgm:bulletEnabled val="1"/>
+        </dgm:presLayoutVars>
+      </dgm:prSet>
+      <dgm:spPr/>
+    </dgm:pt>
+    <dgm:pt modelId="{DC6272FE-BBD3-4723-ABBE-67F8EB2D26BC}" type="pres">
+      <dgm:prSet presAssocID="{C4171DD6-2CE2-4A27-9993-941C3691DC2D}" presName="sibTrans" presStyleLbl="node1" presStyleIdx="0" presStyleCnt="3"/>
+      <dgm:spPr/>
+    </dgm:pt>
+    <dgm:pt modelId="{2AECCF66-5A5D-46FD-A572-02F234CF6380}" type="pres">
+      <dgm:prSet presAssocID="{59A18F8B-8DDC-409A-992A-8939DC56FA19}" presName="dummy" presStyleCnt="0"/>
+      <dgm:spPr/>
+    </dgm:pt>
+    <dgm:pt modelId="{F123EECC-7255-46AA-A983-56A1717B4CD3}" type="pres">
+      <dgm:prSet presAssocID="{59A18F8B-8DDC-409A-992A-8939DC56FA19}" presName="node" presStyleLbl="revTx" presStyleIdx="1" presStyleCnt="3">
+        <dgm:presLayoutVars>
+          <dgm:bulletEnabled val="1"/>
+        </dgm:presLayoutVars>
+      </dgm:prSet>
+      <dgm:spPr/>
+    </dgm:pt>
+    <dgm:pt modelId="{5BA67B04-A8FA-4375-A222-E02F25C19C05}" type="pres">
+      <dgm:prSet presAssocID="{9FDA4F96-5E32-4061-ABFF-9797B27CD0A4}" presName="sibTrans" presStyleLbl="node1" presStyleIdx="1" presStyleCnt="3"/>
+      <dgm:spPr/>
+    </dgm:pt>
+    <dgm:pt modelId="{98A9C20C-43E0-43ED-9E1C-A54D7F6F5CDA}" type="pres">
+      <dgm:prSet presAssocID="{41BAC26F-4A6E-46F4-B068-6FB2D097BD35}" presName="dummy" presStyleCnt="0"/>
+      <dgm:spPr/>
+    </dgm:pt>
+    <dgm:pt modelId="{73577B19-F69B-433C-9517-F25BE5C55101}" type="pres">
+      <dgm:prSet presAssocID="{41BAC26F-4A6E-46F4-B068-6FB2D097BD35}" presName="node" presStyleLbl="revTx" presStyleIdx="2" presStyleCnt="3">
+        <dgm:presLayoutVars>
+          <dgm:bulletEnabled val="1"/>
+        </dgm:presLayoutVars>
+      </dgm:prSet>
+      <dgm:spPr/>
+    </dgm:pt>
+    <dgm:pt modelId="{6EAD451C-244A-40AC-8F93-429B4328DFFF}" type="pres">
+      <dgm:prSet presAssocID="{C3DBBE8D-F1C7-4171-9D53-AD6851916DFB}" presName="sibTrans" presStyleLbl="node1" presStyleIdx="2" presStyleCnt="3"/>
+      <dgm:spPr/>
+    </dgm:pt>
+  </dgm:ptLst>
+  <dgm:cxnLst>
+    <dgm:cxn modelId="{F6BEF600-1612-4E06-8D31-62D52C09215B}" type="presOf" srcId="{9FDA4F96-5E32-4061-ABFF-9797B27CD0A4}" destId="{5BA67B04-A8FA-4375-A222-E02F25C19C05}" srcOrd="0" destOrd="0" presId="urn:microsoft.com/office/officeart/2005/8/layout/cycle1"/>
+    <dgm:cxn modelId="{F3724A11-5C10-41E3-BBE4-2E552A6CDB42}" type="presOf" srcId="{ABCB9C71-6CBB-4802-BD56-E7703ECBB05E}" destId="{E3A37E31-EBEE-4A4A-A109-C4C4401558E8}" srcOrd="0" destOrd="0" presId="urn:microsoft.com/office/officeart/2005/8/layout/cycle1"/>
+    <dgm:cxn modelId="{90587321-C7E3-4006-BFD3-1EFE0CE745FE}" type="presOf" srcId="{C4171DD6-2CE2-4A27-9993-941C3691DC2D}" destId="{DC6272FE-BBD3-4723-ABBE-67F8EB2D26BC}" srcOrd="0" destOrd="0" presId="urn:microsoft.com/office/officeart/2005/8/layout/cycle1"/>
+    <dgm:cxn modelId="{6717EB22-E460-4A59-9C7E-F907D03F1E5C}" type="presOf" srcId="{3EADE527-C8BF-4C29-A3EE-C4A7C6C84A77}" destId="{6386276D-3BC8-4495-9AEC-DDFA1A6DE38D}" srcOrd="0" destOrd="0" presId="urn:microsoft.com/office/officeart/2005/8/layout/cycle1"/>
+    <dgm:cxn modelId="{2214875C-8E30-4940-936A-8125BB437805}" srcId="{3EADE527-C8BF-4C29-A3EE-C4A7C6C84A77}" destId="{ABCB9C71-6CBB-4802-BD56-E7703ECBB05E}" srcOrd="0" destOrd="0" parTransId="{0B6617B5-7020-4938-A375-54D44CF32FD1}" sibTransId="{C4171DD6-2CE2-4A27-9993-941C3691DC2D}"/>
+    <dgm:cxn modelId="{A894C173-FAB9-4CC5-BC34-EE6EDCDB1E9B}" srcId="{3EADE527-C8BF-4C29-A3EE-C4A7C6C84A77}" destId="{59A18F8B-8DDC-409A-992A-8939DC56FA19}" srcOrd="1" destOrd="0" parTransId="{AAEB6786-0C3D-49CF-80F2-5A8FFA7814C0}" sibTransId="{9FDA4F96-5E32-4061-ABFF-9797B27CD0A4}"/>
+    <dgm:cxn modelId="{8A46BBA4-C012-444A-919F-E637A6DE3D39}" type="presOf" srcId="{C3DBBE8D-F1C7-4171-9D53-AD6851916DFB}" destId="{6EAD451C-244A-40AC-8F93-429B4328DFFF}" srcOrd="0" destOrd="0" presId="urn:microsoft.com/office/officeart/2005/8/layout/cycle1"/>
+    <dgm:cxn modelId="{A3E27DAA-E660-4BF3-B4F9-BDB9053EC334}" type="presOf" srcId="{41BAC26F-4A6E-46F4-B068-6FB2D097BD35}" destId="{73577B19-F69B-433C-9517-F25BE5C55101}" srcOrd="0" destOrd="0" presId="urn:microsoft.com/office/officeart/2005/8/layout/cycle1"/>
+    <dgm:cxn modelId="{BFAA26DA-1E0B-4E5F-AAED-D7D3D224BB02}" srcId="{3EADE527-C8BF-4C29-A3EE-C4A7C6C84A77}" destId="{41BAC26F-4A6E-46F4-B068-6FB2D097BD35}" srcOrd="2" destOrd="0" parTransId="{9A9692BC-F13E-4E6F-96EA-36132F4CF07A}" sibTransId="{C3DBBE8D-F1C7-4171-9D53-AD6851916DFB}"/>
+    <dgm:cxn modelId="{FADFFDFE-0916-449B-9585-11E97B153ABA}" type="presOf" srcId="{59A18F8B-8DDC-409A-992A-8939DC56FA19}" destId="{F123EECC-7255-46AA-A983-56A1717B4CD3}" srcOrd="0" destOrd="0" presId="urn:microsoft.com/office/officeart/2005/8/layout/cycle1"/>
+    <dgm:cxn modelId="{A48DF382-6223-4D29-9225-E902516A5B65}" type="presParOf" srcId="{6386276D-3BC8-4495-9AEC-DDFA1A6DE38D}" destId="{95E2BECC-C9DF-45D6-BD8A-16128B82A92C}" srcOrd="0" destOrd="0" presId="urn:microsoft.com/office/officeart/2005/8/layout/cycle1"/>
+    <dgm:cxn modelId="{A18F1B10-1153-44A5-8625-E6D4A9ABC116}" type="presParOf" srcId="{6386276D-3BC8-4495-9AEC-DDFA1A6DE38D}" destId="{E3A37E31-EBEE-4A4A-A109-C4C4401558E8}" srcOrd="1" destOrd="0" presId="urn:microsoft.com/office/officeart/2005/8/layout/cycle1"/>
+    <dgm:cxn modelId="{721DAE26-58A8-42D7-A6F6-2E82521751D0}" type="presParOf" srcId="{6386276D-3BC8-4495-9AEC-DDFA1A6DE38D}" destId="{DC6272FE-BBD3-4723-ABBE-67F8EB2D26BC}" srcOrd="2" destOrd="0" presId="urn:microsoft.com/office/officeart/2005/8/layout/cycle1"/>
+    <dgm:cxn modelId="{F3C5CD8D-4674-4998-B638-CDE06B6260B5}" type="presParOf" srcId="{6386276D-3BC8-4495-9AEC-DDFA1A6DE38D}" destId="{2AECCF66-5A5D-46FD-A572-02F234CF6380}" srcOrd="3" destOrd="0" presId="urn:microsoft.com/office/officeart/2005/8/layout/cycle1"/>
+    <dgm:cxn modelId="{DB3D2023-822D-4801-B2D4-61DBC981BD21}" type="presParOf" srcId="{6386276D-3BC8-4495-9AEC-DDFA1A6DE38D}" destId="{F123EECC-7255-46AA-A983-56A1717B4CD3}" srcOrd="4" destOrd="0" presId="urn:microsoft.com/office/officeart/2005/8/layout/cycle1"/>
+    <dgm:cxn modelId="{CB45D1A2-E7AA-4023-9756-C41D34262504}" type="presParOf" srcId="{6386276D-3BC8-4495-9AEC-DDFA1A6DE38D}" destId="{5BA67B04-A8FA-4375-A222-E02F25C19C05}" srcOrd="5" destOrd="0" presId="urn:microsoft.com/office/officeart/2005/8/layout/cycle1"/>
+    <dgm:cxn modelId="{23F4B2FE-7953-4AE3-926F-D81A97BE1688}" type="presParOf" srcId="{6386276D-3BC8-4495-9AEC-DDFA1A6DE38D}" destId="{98A9C20C-43E0-43ED-9E1C-A54D7F6F5CDA}" srcOrd="6" destOrd="0" presId="urn:microsoft.com/office/officeart/2005/8/layout/cycle1"/>
+    <dgm:cxn modelId="{C6B774A8-B9C7-45FC-A863-7AE364F87B32}" type="presParOf" srcId="{6386276D-3BC8-4495-9AEC-DDFA1A6DE38D}" destId="{73577B19-F69B-433C-9517-F25BE5C55101}" srcOrd="7" destOrd="0" presId="urn:microsoft.com/office/officeart/2005/8/layout/cycle1"/>
+    <dgm:cxn modelId="{AC7B52CA-3140-4EFD-B011-92DFF9A0829D}" type="presParOf" srcId="{6386276D-3BC8-4495-9AEC-DDFA1A6DE38D}" destId="{6EAD451C-244A-40AC-8F93-429B4328DFFF}" srcOrd="8" destOrd="0" presId="urn:microsoft.com/office/officeart/2005/8/layout/cycle1"/>
+  </dgm:cxnLst>
+  <dgm:bg/>
+  <dgm:whole/>
+  <dgm:extLst>
+    <a:ext uri="http://schemas.microsoft.com/office/drawing/2008/diagram">
+      <dsp:dataModelExt xmlns:dsp="http://schemas.microsoft.com/office/drawing/2008/diagram" relId="rId6" minVer="http://schemas.openxmlformats.org/drawingml/2006/diagram"/>
+    </a:ext>
+  </dgm:extLst>
+</dgm:dataModel>
+</file>
+
+<file path=ppt/diagrams/drawing1.xml><?xml version="1.0" encoding="utf-8"?>
+<dsp:drawing xmlns:dgm="http://schemas.openxmlformats.org/drawingml/2006/diagram" xmlns:dsp="http://schemas.microsoft.com/office/drawing/2008/diagram" xmlns:a="http://schemas.openxmlformats.org/drawingml/2006/main">
+  <dsp:spTree>
+    <dsp:nvGrpSpPr>
+      <dsp:cNvPr id="0" name=""/>
+      <dsp:cNvGrpSpPr/>
+    </dsp:nvGrpSpPr>
+    <dsp:grpSpPr/>
+    <dsp:sp modelId="{E3A37E31-EBEE-4A4A-A109-C4C4401558E8}">
+      <dsp:nvSpPr>
+        <dsp:cNvPr id="0" name=""/>
+        <dsp:cNvSpPr/>
+      </dsp:nvSpPr>
+      <dsp:spPr>
+        <a:xfrm>
+          <a:off x="1538912" y="149139"/>
+          <a:ext cx="758845" cy="758845"/>
+        </a:xfrm>
+        <a:prstGeom prst="rect">
+          <a:avLst/>
+        </a:prstGeom>
+        <a:noFill/>
+        <a:ln>
+          <a:noFill/>
+        </a:ln>
+        <a:effectLst/>
+      </dsp:spPr>
+      <dsp:style>
+        <a:lnRef idx="0">
+          <a:scrgbClr r="0" g="0" b="0"/>
+        </a:lnRef>
+        <a:fillRef idx="0">
+          <a:scrgbClr r="0" g="0" b="0"/>
+        </a:fillRef>
+        <a:effectRef idx="0">
+          <a:scrgbClr r="0" g="0" b="0"/>
+        </a:effectRef>
+        <a:fontRef idx="minor"/>
+      </dsp:style>
+      <dsp:txBody>
+        <a:bodyPr spcFirstLastPara="0" vert="horz" wrap="square" lIns="30480" tIns="30480" rIns="30480" bIns="30480" numCol="1" spcCol="1270" anchor="ctr" anchorCtr="0">
+          <a:noAutofit/>
+        </a:bodyPr>
+        <a:lstStyle/>
+        <a:p>
+          <a:pPr marL="0" lvl="0" indent="0" algn="ctr" defTabSz="1066800">
+            <a:lnSpc>
+              <a:spcPct val="90000"/>
+            </a:lnSpc>
+            <a:spcBef>
+              <a:spcPct val="0"/>
+            </a:spcBef>
+            <a:spcAft>
+              <a:spcPct val="35000"/>
+            </a:spcAft>
+            <a:buNone/>
+          </a:pPr>
+          <a:r>
+            <a:rPr lang="en-US" sz="2400" kern="1200" dirty="0"/>
+            <a:t>Event</a:t>
+          </a:r>
+          <a:endParaRPr lang="en-IN" sz="2400" kern="1200" dirty="0"/>
+        </a:p>
+      </dsp:txBody>
+      <dsp:txXfrm>
+        <a:off x="1538912" y="149139"/>
+        <a:ext cx="758845" cy="758845"/>
+      </dsp:txXfrm>
+    </dsp:sp>
+    <dsp:sp modelId="{DC6272FE-BBD3-4723-ABBE-67F8EB2D26BC}">
+      <dsp:nvSpPr>
+        <dsp:cNvPr id="0" name=""/>
+        <dsp:cNvSpPr/>
+      </dsp:nvSpPr>
+      <dsp:spPr>
+        <a:xfrm>
+          <a:off x="382954" y="-193"/>
+          <a:ext cx="1794412" cy="1794412"/>
+        </a:xfrm>
+        <a:prstGeom prst="circularArrow">
+          <a:avLst>
+            <a:gd name="adj1" fmla="val 8246"/>
+            <a:gd name="adj2" fmla="val 575943"/>
+            <a:gd name="adj3" fmla="val 2964651"/>
+            <a:gd name="adj4" fmla="val 51190"/>
+            <a:gd name="adj5" fmla="val 9621"/>
+          </a:avLst>
+        </a:prstGeom>
+        <a:gradFill rotWithShape="0">
+          <a:gsLst>
+            <a:gs pos="0">
+              <a:schemeClr val="accent2">
+                <a:hueOff val="0"/>
+                <a:satOff val="0"/>
+                <a:lumOff val="0"/>
+                <a:alphaOff val="0"/>
+                <a:satMod val="103000"/>
+                <a:lumMod val="102000"/>
+                <a:tint val="94000"/>
+              </a:schemeClr>
+            </a:gs>
+            <a:gs pos="50000">
+              <a:schemeClr val="accent2">
+                <a:hueOff val="0"/>
+                <a:satOff val="0"/>
+                <a:lumOff val="0"/>
+                <a:alphaOff val="0"/>
+                <a:satMod val="110000"/>
+                <a:lumMod val="100000"/>
+                <a:shade val="100000"/>
+              </a:schemeClr>
+            </a:gs>
+            <a:gs pos="100000">
+              <a:schemeClr val="accent2">
+                <a:hueOff val="0"/>
+                <a:satOff val="0"/>
+                <a:lumOff val="0"/>
+                <a:alphaOff val="0"/>
+                <a:lumMod val="99000"/>
+                <a:satMod val="120000"/>
+                <a:shade val="78000"/>
+              </a:schemeClr>
+            </a:gs>
+          </a:gsLst>
+          <a:lin ang="5400000" scaled="0"/>
+        </a:gradFill>
+        <a:ln>
+          <a:noFill/>
+        </a:ln>
+        <a:effectLst>
+          <a:outerShdw blurRad="57150" dist="19050" dir="5400000" algn="ctr" rotWithShape="0">
+            <a:srgbClr val="000000">
+              <a:alpha val="63000"/>
+            </a:srgbClr>
+          </a:outerShdw>
+        </a:effectLst>
+      </dsp:spPr>
+      <dsp:style>
+        <a:lnRef idx="0">
+          <a:scrgbClr r="0" g="0" b="0"/>
+        </a:lnRef>
+        <a:fillRef idx="3">
+          <a:scrgbClr r="0" g="0" b="0"/>
+        </a:fillRef>
+        <a:effectRef idx="3">
+          <a:scrgbClr r="0" g="0" b="0"/>
+        </a:effectRef>
+        <a:fontRef idx="minor">
+          <a:schemeClr val="lt1"/>
+        </a:fontRef>
+      </dsp:style>
+    </dsp:sp>
+    <dsp:sp modelId="{F123EECC-7255-46AA-A983-56A1717B4CD3}">
+      <dsp:nvSpPr>
+        <dsp:cNvPr id="0" name=""/>
+        <dsp:cNvSpPr/>
+      </dsp:nvSpPr>
+      <dsp:spPr>
+        <a:xfrm>
+          <a:off x="900737" y="1254490"/>
+          <a:ext cx="758845" cy="758845"/>
+        </a:xfrm>
+        <a:prstGeom prst="rect">
+          <a:avLst/>
+        </a:prstGeom>
+        <a:noFill/>
+        <a:ln>
+          <a:noFill/>
+        </a:ln>
+        <a:effectLst/>
+      </dsp:spPr>
+      <dsp:style>
+        <a:lnRef idx="0">
+          <a:scrgbClr r="0" g="0" b="0"/>
+        </a:lnRef>
+        <a:fillRef idx="0">
+          <a:scrgbClr r="0" g="0" b="0"/>
+        </a:fillRef>
+        <a:effectRef idx="0">
+          <a:scrgbClr r="0" g="0" b="0"/>
+        </a:effectRef>
+        <a:fontRef idx="minor"/>
+      </dsp:style>
+      <dsp:txBody>
+        <a:bodyPr spcFirstLastPara="0" vert="horz" wrap="square" lIns="30480" tIns="30480" rIns="30480" bIns="30480" numCol="1" spcCol="1270" anchor="ctr" anchorCtr="0">
+          <a:noAutofit/>
+        </a:bodyPr>
+        <a:lstStyle/>
+        <a:p>
+          <a:pPr marL="0" lvl="0" indent="0" algn="ctr" defTabSz="1066800">
+            <a:lnSpc>
+              <a:spcPct val="90000"/>
+            </a:lnSpc>
+            <a:spcBef>
+              <a:spcPct val="0"/>
+            </a:spcBef>
+            <a:spcAft>
+              <a:spcPct val="35000"/>
+            </a:spcAft>
+            <a:buNone/>
+          </a:pPr>
+          <a:r>
+            <a:rPr lang="en-US" sz="2400" kern="1200" dirty="0"/>
+            <a:t>Loop</a:t>
+          </a:r>
+          <a:endParaRPr lang="en-IN" sz="2400" kern="1200" dirty="0"/>
+        </a:p>
+      </dsp:txBody>
+      <dsp:txXfrm>
+        <a:off x="900737" y="1254490"/>
+        <a:ext cx="758845" cy="758845"/>
+      </dsp:txXfrm>
+    </dsp:sp>
+    <dsp:sp modelId="{5BA67B04-A8FA-4375-A222-E02F25C19C05}">
+      <dsp:nvSpPr>
+        <dsp:cNvPr id="0" name=""/>
+        <dsp:cNvSpPr/>
+      </dsp:nvSpPr>
+      <dsp:spPr>
+        <a:xfrm>
+          <a:off x="382954" y="-193"/>
+          <a:ext cx="1794412" cy="1794412"/>
+        </a:xfrm>
+        <a:prstGeom prst="circularArrow">
+          <a:avLst>
+            <a:gd name="adj1" fmla="val 8246"/>
+            <a:gd name="adj2" fmla="val 575943"/>
+            <a:gd name="adj3" fmla="val 10172867"/>
+            <a:gd name="adj4" fmla="val 7259406"/>
+            <a:gd name="adj5" fmla="val 9621"/>
+          </a:avLst>
+        </a:prstGeom>
+        <a:gradFill rotWithShape="0">
+          <a:gsLst>
+            <a:gs pos="0">
+              <a:schemeClr val="accent2">
+                <a:hueOff val="0"/>
+                <a:satOff val="0"/>
+                <a:lumOff val="0"/>
+                <a:alphaOff val="0"/>
+                <a:satMod val="103000"/>
+                <a:lumMod val="102000"/>
+                <a:tint val="94000"/>
+              </a:schemeClr>
+            </a:gs>
+            <a:gs pos="50000">
+              <a:schemeClr val="accent2">
+                <a:hueOff val="0"/>
+                <a:satOff val="0"/>
+                <a:lumOff val="0"/>
+                <a:alphaOff val="0"/>
+                <a:satMod val="110000"/>
+                <a:lumMod val="100000"/>
+                <a:shade val="100000"/>
+              </a:schemeClr>
+            </a:gs>
+            <a:gs pos="100000">
+              <a:schemeClr val="accent2">
+                <a:hueOff val="0"/>
+                <a:satOff val="0"/>
+                <a:lumOff val="0"/>
+                <a:alphaOff val="0"/>
+                <a:lumMod val="99000"/>
+                <a:satMod val="120000"/>
+                <a:shade val="78000"/>
+              </a:schemeClr>
+            </a:gs>
+          </a:gsLst>
+          <a:lin ang="5400000" scaled="0"/>
+        </a:gradFill>
+        <a:ln>
+          <a:noFill/>
+        </a:ln>
+        <a:effectLst>
+          <a:outerShdw blurRad="57150" dist="19050" dir="5400000" algn="ctr" rotWithShape="0">
+            <a:srgbClr val="000000">
+              <a:alpha val="63000"/>
+            </a:srgbClr>
+          </a:outerShdw>
+        </a:effectLst>
+      </dsp:spPr>
+      <dsp:style>
+        <a:lnRef idx="0">
+          <a:scrgbClr r="0" g="0" b="0"/>
+        </a:lnRef>
+        <a:fillRef idx="3">
+          <a:scrgbClr r="0" g="0" b="0"/>
+        </a:fillRef>
+        <a:effectRef idx="3">
+          <a:scrgbClr r="0" g="0" b="0"/>
+        </a:effectRef>
+        <a:fontRef idx="minor">
+          <a:schemeClr val="lt1"/>
+        </a:fontRef>
+      </dsp:style>
+    </dsp:sp>
+    <dsp:sp modelId="{73577B19-F69B-433C-9517-F25BE5C55101}">
+      <dsp:nvSpPr>
+        <dsp:cNvPr id="0" name=""/>
+        <dsp:cNvSpPr/>
+      </dsp:nvSpPr>
+      <dsp:spPr>
+        <a:xfrm>
+          <a:off x="262563" y="149139"/>
+          <a:ext cx="758845" cy="758845"/>
+        </a:xfrm>
+        <a:prstGeom prst="rect">
+          <a:avLst/>
+        </a:prstGeom>
+        <a:noFill/>
+        <a:ln>
+          <a:noFill/>
+        </a:ln>
+        <a:effectLst/>
+      </dsp:spPr>
+      <dsp:style>
+        <a:lnRef idx="0">
+          <a:scrgbClr r="0" g="0" b="0"/>
+        </a:lnRef>
+        <a:fillRef idx="0">
+          <a:scrgbClr r="0" g="0" b="0"/>
+        </a:fillRef>
+        <a:effectRef idx="0">
+          <a:scrgbClr r="0" g="0" b="0"/>
+        </a:effectRef>
+        <a:fontRef idx="minor"/>
+      </dsp:style>
+      <dsp:txBody>
+        <a:bodyPr spcFirstLastPara="0" vert="horz" wrap="square" lIns="30480" tIns="30480" rIns="30480" bIns="30480" numCol="1" spcCol="1270" anchor="ctr" anchorCtr="0">
+          <a:noAutofit/>
+        </a:bodyPr>
+        <a:lstStyle/>
+        <a:p>
+          <a:pPr marL="0" lvl="0" indent="0" algn="ctr" defTabSz="1066800">
+            <a:lnSpc>
+              <a:spcPct val="90000"/>
+            </a:lnSpc>
+            <a:spcBef>
+              <a:spcPct val="0"/>
+            </a:spcBef>
+            <a:spcAft>
+              <a:spcPct val="35000"/>
+            </a:spcAft>
+            <a:buNone/>
+          </a:pPr>
+          <a:r>
+            <a:rPr lang="en-US" sz="2400" kern="1200" dirty="0"/>
+            <a:t>An</a:t>
+          </a:r>
+          <a:endParaRPr lang="en-IN" sz="2400" kern="1200" dirty="0"/>
+        </a:p>
+      </dsp:txBody>
+      <dsp:txXfrm>
+        <a:off x="262563" y="149139"/>
+        <a:ext cx="758845" cy="758845"/>
+      </dsp:txXfrm>
+    </dsp:sp>
+    <dsp:sp modelId="{6EAD451C-244A-40AC-8F93-429B4328DFFF}">
+      <dsp:nvSpPr>
+        <dsp:cNvPr id="0" name=""/>
+        <dsp:cNvSpPr/>
+      </dsp:nvSpPr>
+      <dsp:spPr>
+        <a:xfrm>
+          <a:off x="382954" y="-193"/>
+          <a:ext cx="1794412" cy="1794412"/>
+        </a:xfrm>
+        <a:prstGeom prst="circularArrow">
+          <a:avLst>
+            <a:gd name="adj1" fmla="val 8246"/>
+            <a:gd name="adj2" fmla="val 575943"/>
+            <a:gd name="adj3" fmla="val 16857464"/>
+            <a:gd name="adj4" fmla="val 14966593"/>
+            <a:gd name="adj5" fmla="val 9621"/>
+          </a:avLst>
+        </a:prstGeom>
+        <a:gradFill rotWithShape="0">
+          <a:gsLst>
+            <a:gs pos="0">
+              <a:schemeClr val="accent2">
+                <a:hueOff val="0"/>
+                <a:satOff val="0"/>
+                <a:lumOff val="0"/>
+                <a:alphaOff val="0"/>
+                <a:satMod val="103000"/>
+                <a:lumMod val="102000"/>
+                <a:tint val="94000"/>
+              </a:schemeClr>
+            </a:gs>
+            <a:gs pos="50000">
+              <a:schemeClr val="accent2">
+                <a:hueOff val="0"/>
+                <a:satOff val="0"/>
+                <a:lumOff val="0"/>
+                <a:alphaOff val="0"/>
+                <a:satMod val="110000"/>
+                <a:lumMod val="100000"/>
+                <a:shade val="100000"/>
+              </a:schemeClr>
+            </a:gs>
+            <a:gs pos="100000">
+              <a:schemeClr val="accent2">
+                <a:hueOff val="0"/>
+                <a:satOff val="0"/>
+                <a:lumOff val="0"/>
+                <a:alphaOff val="0"/>
+                <a:lumMod val="99000"/>
+                <a:satMod val="120000"/>
+                <a:shade val="78000"/>
+              </a:schemeClr>
+            </a:gs>
+          </a:gsLst>
+          <a:lin ang="5400000" scaled="0"/>
+        </a:gradFill>
+        <a:ln>
+          <a:noFill/>
+        </a:ln>
+        <a:effectLst>
+          <a:outerShdw blurRad="57150" dist="19050" dir="5400000" algn="ctr" rotWithShape="0">
+            <a:srgbClr val="000000">
+              <a:alpha val="63000"/>
+            </a:srgbClr>
+          </a:outerShdw>
+        </a:effectLst>
+      </dsp:spPr>
+      <dsp:style>
+        <a:lnRef idx="0">
+          <a:scrgbClr r="0" g="0" b="0"/>
+        </a:lnRef>
+        <a:fillRef idx="3">
+          <a:scrgbClr r="0" g="0" b="0"/>
+        </a:fillRef>
+        <a:effectRef idx="3">
+          <a:scrgbClr r="0" g="0" b="0"/>
+        </a:effectRef>
+        <a:fontRef idx="minor">
+          <a:schemeClr val="lt1"/>
+        </a:fontRef>
+      </dsp:style>
+    </dsp:sp>
+  </dsp:spTree>
+</dsp:drawing>
+</file>
+
+<file path=ppt/diagrams/layout1.xml><?xml version="1.0" encoding="utf-8"?>
+<dgm:layoutDef xmlns:dgm="http://schemas.openxmlformats.org/drawingml/2006/diagram" xmlns:a="http://schemas.openxmlformats.org/drawingml/2006/main" uniqueId="urn:microsoft.com/office/officeart/2005/8/layout/cycle1">
+  <dgm:title val=""/>
+  <dgm:desc val=""/>
+  <dgm:catLst>
+    <dgm:cat type="cycle" pri="2000"/>
+  </dgm:catLst>
+  <dgm:sampData>
+    <dgm:dataModel>
+      <dgm:ptLst>
+        <dgm:pt modelId="0" type="doc"/>
+        <dgm:pt modelId="1">
+          <dgm:prSet phldr="1"/>
+        </dgm:pt>
+        <dgm:pt modelId="2">
+          <dgm:prSet phldr="1"/>
+        </dgm:pt>
+        <dgm:pt modelId="3">
+          <dgm:prSet phldr="1"/>
+        </dgm:pt>
+        <dgm:pt modelId="4">
+          <dgm:prSet phldr="1"/>
+        </dgm:pt>
+        <dgm:pt modelId="5">
+          <dgm:prSet phldr="1"/>
+        </dgm:pt>
+      </dgm:ptLst>
+      <dgm:cxnLst>
+        <dgm:cxn modelId="6" srcId="0" destId="1" srcOrd="0" destOrd="0"/>
+        <dgm:cxn modelId="7" srcId="0" destId="2" srcOrd="1" destOrd="0"/>
+        <dgm:cxn modelId="8" srcId="0" destId="3" srcOrd="2" destOrd="0"/>
+        <dgm:cxn modelId="9" srcId="0" destId="4" srcOrd="3" destOrd="0"/>
+        <dgm:cxn modelId="10" srcId="0" destId="5" srcOrd="4" destOrd="0"/>
+      </dgm:cxnLst>
+      <dgm:bg/>
+      <dgm:whole/>
+    </dgm:dataModel>
+  </dgm:sampData>
+  <dgm:styleData>
+    <dgm:dataModel>
+      <dgm:ptLst>
+        <dgm:pt modelId="0" type="doc"/>
+        <dgm:pt modelId="1"/>
+        <dgm:pt modelId="2"/>
+        <dgm:pt modelId="3"/>
+      </dgm:ptLst>
+      <dgm:cxnLst>
+        <dgm:cxn modelId="4" srcId="0" destId="1" srcOrd="0" destOrd="0"/>
+        <dgm:cxn modelId="5" srcId="0" destId="2" srcOrd="1" destOrd="0"/>
+        <dgm:cxn modelId="6" srcId="0" destId="3" srcOrd="2" destOrd="0"/>
+      </dgm:cxnLst>
+      <dgm:bg/>
+      <dgm:whole/>
+    </dgm:dataModel>
+  </dgm:styleData>
+  <dgm:clrData>
+    <dgm:dataModel>
+      <dgm:ptLst>
+        <dgm:pt modelId="0" type="doc"/>
+        <dgm:pt modelId="1"/>
+        <dgm:pt modelId="2"/>
+        <dgm:pt modelId="3"/>
+        <dgm:pt modelId="4"/>
+        <dgm:pt modelId="5"/>
+        <dgm:pt modelId="6"/>
+      </dgm:ptLst>
+      <dgm:cxnLst>
+        <dgm:cxn modelId="7" srcId="0" destId="1" srcOrd="0" destOrd="0"/>
+        <dgm:cxn modelId="8" srcId="0" destId="2" srcOrd="1" destOrd="0"/>
+        <dgm:cxn modelId="9" srcId="0" destId="3" srcOrd="2" destOrd="0"/>
+        <dgm:cxn modelId="10" srcId="0" destId="4" srcOrd="3" destOrd="0"/>
+        <dgm:cxn modelId="11" srcId="0" destId="5" srcOrd="4" destOrd="0"/>
+        <dgm:cxn modelId="12" srcId="0" destId="6" srcOrd="5" destOrd="0"/>
+      </dgm:cxnLst>
+      <dgm:bg/>
+      <dgm:whole/>
+    </dgm:dataModel>
+  </dgm:clrData>
+  <dgm:layoutNode name="cycle">
+    <dgm:varLst>
+      <dgm:dir/>
+      <dgm:resizeHandles val="exact"/>
+    </dgm:varLst>
+    <dgm:choose name="Name0">
+      <dgm:if name="Name1" func="var" arg="dir" op="equ" val="norm">
+        <dgm:alg type="cycle">
+          <dgm:param type="stAng" val="0"/>
+          <dgm:param type="spanAng" val="360"/>
+        </dgm:alg>
+      </dgm:if>
+      <dgm:else name="Name2">
+        <dgm:alg type="cycle">
+          <dgm:param type="stAng" val="0"/>
+          <dgm:param type="spanAng" val="-360"/>
+        </dgm:alg>
+      </dgm:else>
+    </dgm:choose>
+    <dgm:shape xmlns:r="http://schemas.openxmlformats.org/officeDocument/2006/relationships" r:blip="">
+      <dgm:adjLst/>
+    </dgm:shape>
+    <dgm:presOf/>
+    <dgm:choose name="Name3">
+      <dgm:if name="Name4" func="var" arg="dir" op="equ" val="norm">
+        <dgm:constrLst>
+          <dgm:constr type="diam" val="1"/>
+          <dgm:constr type="w" for="ch" forName="node" refType="w"/>
+          <dgm:constr type="w" for="ch" ptType="sibTrans" refType="w" refFor="ch" refForName="node" fact="0.5"/>
+          <dgm:constr type="h" for="ch" ptType="sibTrans" op="equ"/>
+          <dgm:constr type="diam" for="ch" ptType="sibTrans" refType="diam" op="equ"/>
+          <dgm:constr type="sibSp" refType="w" refFor="ch" refForName="node" fact="0.15"/>
+          <dgm:constr type="w" for="ch" forName="dummy" refType="sibSp" fact="2.8"/>
+          <dgm:constr type="primFontSz" for="ch" forName="node" op="equ" val="65"/>
+        </dgm:constrLst>
+      </dgm:if>
+      <dgm:else name="Name5">
+        <dgm:constrLst>
+          <dgm:constr type="diam" val="1"/>
+          <dgm:constr type="w" for="ch" forName="node" refType="w"/>
+          <dgm:constr type="w" for="ch" ptType="sibTrans" refType="w" refFor="ch" refForName="node" fact="0.5"/>
+          <dgm:constr type="h" for="ch" ptType="sibTrans" op="equ"/>
+          <dgm:constr type="diam" for="ch" ptType="sibTrans" refType="diam" op="equ" fact="-1"/>
+          <dgm:constr type="sibSp" refType="w" refFor="ch" refForName="node" fact="0.15"/>
+          <dgm:constr type="w" for="ch" forName="dummy" refType="sibSp" fact="2.8"/>
+          <dgm:constr type="primFontSz" for="ch" forName="node" op="equ" val="65"/>
+        </dgm:constrLst>
+      </dgm:else>
+    </dgm:choose>
+    <dgm:ruleLst>
+      <dgm:rule type="diam" val="INF" fact="NaN" max="NaN"/>
+    </dgm:ruleLst>
+    <dgm:forEach name="nodesForEach" axis="ch" ptType="node">
+      <dgm:choose name="Name6">
+        <dgm:if name="Name7" axis="par ch" ptType="doc node" func="cnt" op="gt" val="1">
+          <dgm:layoutNode name="dummy">
+            <dgm:alg type="sp"/>
+            <dgm:shape xmlns:r="http://schemas.openxmlformats.org/officeDocument/2006/relationships" r:blip="">
+              <dgm:adjLst/>
+            </dgm:shape>
+            <dgm:presOf/>
+            <dgm:constrLst>
+              <dgm:constr type="h" refType="w"/>
+            </dgm:constrLst>
+            <dgm:ruleLst/>
+          </dgm:layoutNode>
+        </dgm:if>
+        <dgm:else name="Name8"/>
+      </dgm:choose>
+      <dgm:layoutNode name="node" styleLbl="revTx">
+        <dgm:varLst>
+          <dgm:bulletEnabled val="1"/>
+        </dgm:varLst>
+        <dgm:alg type="tx">
+          <dgm:param type="txAnchorVertCh" val="mid"/>
+        </dgm:alg>
+        <dgm:shape xmlns:r="http://schemas.openxmlformats.org/officeDocument/2006/relationships" type="rect" r:blip="">
+          <dgm:adjLst/>
+        </dgm:shape>
+        <dgm:presOf axis="desOrSelf" ptType="node"/>
+        <dgm:constrLst>
+          <dgm:constr type="h" refType="w"/>
+          <dgm:constr type="lMarg" refType="primFontSz" fact="0.1"/>
+          <dgm:constr type="rMarg" refType="primFontSz" fact="0.1"/>
+          <dgm:constr type="tMarg" refType="primFontSz" fact="0.1"/>
+          <dgm:constr type="bMarg" refType="primFontSz" fact="0.1"/>
+        </dgm:constrLst>
+        <dgm:ruleLst>
+          <dgm:rule type="primFontSz" val="5" fact="NaN" max="NaN"/>
+        </dgm:ruleLst>
+      </dgm:layoutNode>
+      <dgm:choose name="Name9">
+        <dgm:if name="Name10" axis="par ch" ptType="doc node" func="cnt" op="gt" val="1">
+          <dgm:forEach name="Name11" axis="followSib" ptType="sibTrans" hideLastTrans="0" cnt="1">
+            <dgm:layoutNode name="sibTrans" styleLbl="node1">
+              <dgm:alg type="conn">
+                <dgm:param type="connRout" val="curve"/>
+                <dgm:param type="begPts" val="radial"/>
+                <dgm:param type="endPts" val="radial"/>
+              </dgm:alg>
+              <dgm:shape xmlns:r="http://schemas.openxmlformats.org/officeDocument/2006/relationships" type="conn" r:blip="">
+                <dgm:adjLst/>
+              </dgm:shape>
+              <dgm:presOf axis="self"/>
+              <dgm:constrLst>
+                <dgm:constr type="h" refType="w" fact="0.65"/>
+                <dgm:constr type="begPad"/>
+                <dgm:constr type="endPad"/>
+              </dgm:constrLst>
+              <dgm:ruleLst/>
+            </dgm:layoutNode>
+          </dgm:forEach>
+        </dgm:if>
+        <dgm:else name="Name12"/>
+      </dgm:choose>
+    </dgm:forEach>
+  </dgm:layoutNode>
+</dgm:layoutDef>
+</file>
+
+<file path=ppt/diagrams/quickStyle1.xml><?xml version="1.0" encoding="utf-8"?>
+<dgm:styleDef xmlns:dgm="http://schemas.openxmlformats.org/drawingml/2006/diagram" xmlns:a="http://schemas.openxmlformats.org/drawingml/2006/main" uniqueId="urn:microsoft.com/office/officeart/2005/8/quickstyle/simple5">
+  <dgm:title val=""/>
+  <dgm:desc val=""/>
+  <dgm:catLst>
+    <dgm:cat type="simple" pri="10500"/>
+  </dgm:catLst>
+  <dgm:scene3d>
+    <a:camera prst="orthographicFront"/>
+    <a:lightRig rig="threePt" dir="t"/>
+  </dgm:scene3d>
+  <dgm:styleLbl name="node0">
+    <dgm:scene3d>
+      <a:camera prst="orthographicFront"/>
+      <a:lightRig rig="threePt" dir="t"/>
+    </dgm:scene3d>
+    <dgm:sp3d/>
+    <dgm:txPr/>
+    <dgm:style>
+      <a:lnRef idx="0">
+        <a:scrgbClr r="0" g="0" b="0"/>
+      </a:lnRef>
+      <a:fillRef idx="3">
+        <a:scrgbClr r="0" g="0" b="0"/>
+      </a:fillRef>
+      <a:effectRef idx="3">
+        <a:scrgbClr r="0" g="0" b="0"/>
+      </a:effectRef>
+      <a:fontRef idx="minor">
+        <a:schemeClr val="lt1"/>
+      </a:fontRef>
+    </dgm:style>
+  </dgm:styleLbl>
+  <dgm:styleLbl name="lnNode1">
+    <dgm:scene3d>
+      <a:camera prst="orthographicFront"/>
+      <a:lightRig rig="threePt" dir="t"/>
+    </dgm:scene3d>
+    <dgm:sp3d/>
+    <dgm:txPr/>
+    <dgm:style>
+      <a:lnRef idx="0">
+        <a:scrgbClr r="0" g="0" b="0"/>
+      </a:lnRef>
+      <a:fillRef idx="3">
+        <a:scrgbClr r="0" g="0" b="0"/>
+      </a:fillRef>
+      <a:effectRef idx="3">
+        <a:scrgbClr r="0" g="0" b="0"/>
+      </a:effectRef>
+      <a:fontRef idx="minor">
+        <a:schemeClr val="lt1"/>
+      </a:fontRef>
+    </dgm:style>
+  </dgm:styleLbl>
+  <dgm:styleLbl name="vennNode1">
+    <dgm:scene3d>
+      <a:camera prst="orthographicFront"/>
+      <a:lightRig rig="threePt" dir="t"/>
+    </dgm:scene3d>
+    <dgm:sp3d/>
+    <dgm:txPr/>
+    <dgm:style>
+      <a:lnRef idx="0">
+        <a:scrgbClr r="0" g="0" b="0"/>
+      </a:lnRef>
+      <a:fillRef idx="3">
+        <a:scrgbClr r="0" g="0" b="0"/>
+      </a:fillRef>
+      <a:effectRef idx="3">
+        <a:scrgbClr r="0" g="0" b="0"/>
+      </a:effectRef>
+      <a:fontRef idx="minor">
+        <a:schemeClr val="tx1"/>
+      </a:fontRef>
+    </dgm:style>
+  </dgm:styleLbl>
+  <dgm:styleLbl name="alignNode1">
+    <dgm:scene3d>
+      <a:camera prst="orthographicFront"/>
+      <a:lightRig rig="threePt" dir="t"/>
+    </dgm:scene3d>
+    <dgm:sp3d/>
+    <dgm:txPr/>
+    <dgm:style>
+      <a:lnRef idx="1">
+        <a:scrgbClr r="0" g="0" b="0"/>
+      </a:lnRef>
+      <a:fillRef idx="3">
+        <a:scrgbClr r="0" g="0" b="0"/>
+      </a:fillRef>
+      <a:effectRef idx="3">
+        <a:scrgbClr r="0" g="0" b="0"/>
+      </a:effectRef>
+      <a:fontRef idx="minor">
+        <a:schemeClr val="lt1"/>
+      </a:fontRef>
+    </dgm:style>
+  </dgm:styleLbl>
+  <dgm:styleLbl name="node1">
+    <dgm:scene3d>
+      <a:camera prst="orthographicFront"/>
+      <a:lightRig rig="threePt" dir="t"/>
+    </dgm:scene3d>
+    <dgm:sp3d/>
+    <dgm:txPr/>
+    <dgm:style>
+      <a:lnRef idx="0">
+        <a:scrgbClr r="0" g="0" b="0"/>
+      </a:lnRef>
+      <a:fillRef idx="3">
+        <a:scrgbClr r="0" g="0" b="0"/>
+      </a:fillRef>
+      <a:effectRef idx="3">
+        <a:scrgbClr r="0" g="0" b="0"/>
+      </a:effectRef>
+      <a:fontRef idx="minor">
+        <a:schemeClr val="lt1"/>
+      </a:fontRef>
+    </dgm:style>
+  </dgm:styleLbl>
+  <dgm:styleLbl name="node2">
+    <dgm:scene3d>
+      <a:camera prst="orthographicFront"/>
+      <a:lightRig rig="threePt" dir="t"/>
+    </dgm:scene3d>
+    <dgm:sp3d/>
+    <dgm:txPr/>
+    <dgm:style>
+      <a:lnRef idx="0">
+        <a:scrgbClr r="0" g="0" b="0"/>
+      </a:lnRef>
+      <a:fillRef idx="3">
+        <a:scrgbClr r="0" g="0" b="0"/>
+      </a:fillRef>
+      <a:effectRef idx="3">
+        <a:scrgbClr r="0" g="0" b="0"/>
+      </a:effectRef>
+      <a:fontRef idx="minor">
+        <a:schemeClr val="lt1"/>
+      </a:fontRef>
+    </dgm:style>
+  </dgm:styleLbl>
+  <dgm:styleLbl name="node3">
+    <dgm:scene3d>
+      <a:camera prst="orthographicFront"/>
+      <a:lightRig rig="threePt" dir="t"/>
+    </dgm:scene3d>
+    <dgm:sp3d/>
+    <dgm:txPr/>
+    <dgm:style>
+      <a:lnRef idx="0">
+        <a:scrgbClr r="0" g="0" b="0"/>
+      </a:lnRef>
+      <a:fillRef idx="3">
+        <a:scrgbClr r="0" g="0" b="0"/>
+      </a:fillRef>
+      <a:effectRef idx="3">
+        <a:scrgbClr r="0" g="0" b="0"/>
+      </a:effectRef>
+      <a:fontRef idx="minor">
+        <a:schemeClr val="lt1"/>
+      </a:fontRef>
+    </dgm:style>
+  </dgm:styleLbl>
+  <dgm:styleLbl name="node4">
+    <dgm:scene3d>
+      <a:camera prst="orthographicFront"/>
+      <a:lightRig rig="threePt" dir="t"/>
+    </dgm:scene3d>
+    <dgm:sp3d/>
+    <dgm:txPr/>
+    <dgm:style>
+      <a:lnRef idx="0">
+        <a:scrgbClr r="0" g="0" b="0"/>
+      </a:lnRef>
+      <a:fillRef idx="3">
+        <a:scrgbClr r="0" g="0" b="0"/>
+      </a:fillRef>
+      <a:effectRef idx="3">
+        <a:scrgbClr r="0" g="0" b="0"/>
+      </a:effectRef>
+      <a:fontRef idx="minor">
+        <a:schemeClr val="lt1"/>
+      </a:fontRef>
+    </dgm:style>
+  </dgm:styleLbl>
+  <dgm:styleLbl name="fgImgPlace1">
+    <dgm:scene3d>
+      <a:camera prst="orthographicFront"/>
+      <a:lightRig rig="threePt" dir="t"/>
+    </dgm:scene3d>
+    <dgm:sp3d/>
+    <dgm:txPr/>
+    <dgm:style>
+      <a:lnRef idx="0">
+        <a:scrgbClr r="0" g="0" b="0"/>
+      </a:lnRef>
+      <a:fillRef idx="1">
+        <a:scrgbClr r="0" g="0" b="0"/>
+      </a:fillRef>
+      <a:effectRef idx="3">
+        <a:scrgbClr r="0" g="0" b="0"/>
+      </a:effectRef>
+      <a:fontRef idx="minor"/>
+    </dgm:style>
+  </dgm:styleLbl>
+  <dgm:styleLbl name="alignImgPlace1">
+    <dgm:scene3d>
+      <a:camera prst="orthographicFront"/>
+      <a:lightRig rig="threePt" dir="t"/>
+    </dgm:scene3d>
+    <dgm:sp3d/>
+    <dgm:txPr/>
+    <dgm:style>
+      <a:lnRef idx="0">
+        <a:scrgbClr r="0" g="0" b="0"/>
+      </a:lnRef>
+      <a:fillRef idx="1">
+        <a:scrgbClr r="0" g="0" b="0"/>
+      </a:fillRef>
+      <a:effectRef idx="3">
+        <a:scrgbClr r="0" g="0" b="0"/>
+      </a:effectRef>
+      <a:fontRef idx="minor"/>
+    </dgm:style>
+  </dgm:styleLbl>
+  <dgm:styleLbl name="bgImgPlace1">
+    <dgm:scene3d>
+      <a:camera prst="orthographicFront"/>
+      <a:lightRig rig="threePt" dir="t"/>
+    </dgm:scene3d>
+    <dgm:sp3d/>
+    <dgm:txPr/>
+    <dgm:style>
+      <a:lnRef idx="0">
+        <a:scrgbClr r="0" g="0" b="0"/>
+      </a:lnRef>
+      <a:fillRef idx="1">
+        <a:scrgbClr r="0" g="0" b="0"/>
+      </a:fillRef>
+      <a:effectRef idx="3">
+        <a:scrgbClr r="0" g="0" b="0"/>
+      </a:effectRef>
+      <a:fontRef idx="minor"/>
+    </dgm:style>
+  </dgm:styleLbl>
+  <dgm:styleLbl name="sibTrans2D1">
+    <dgm:scene3d>
+      <a:camera prst="orthographicFront"/>
+      <a:lightRig rig="threePt" dir="t"/>
+    </dgm:scene3d>
+    <dgm:sp3d/>
+    <dgm:txPr/>
+    <dgm:style>
+      <a:lnRef idx="0">
+        <a:scrgbClr r="0" g="0" b="0"/>
+      </a:lnRef>
+      <a:fillRef idx="3">
+        <a:scrgbClr r="0" g="0" b="0"/>
+      </a:fillRef>
+      <a:effectRef idx="3">
+        <a:scrgbClr r="0" g="0" b="0"/>
+      </a:effectRef>
+      <a:fontRef idx="minor">
+        <a:schemeClr val="lt1"/>
+      </a:fontRef>
+    </dgm:style>
+  </dgm:styleLbl>
+  <dgm:styleLbl name="fgSibTrans2D1">
+    <dgm:scene3d>
+      <a:camera prst="orthographicFront"/>
+      <a:lightRig rig="threePt" dir="t"/>
+    </dgm:scene3d>
+    <dgm:sp3d/>
+    <dgm:txPr/>
+    <dgm:style>
+      <a:lnRef idx="0">
+        <a:scrgbClr r="0" g="0" b="0"/>
+      </a:lnRef>
+      <a:fillRef idx="3">
+        <a:scrgbClr r="0" g="0" b="0"/>
+      </a:fillRef>
+      <a:effectRef idx="3">
+        <a:scrgbClr r="0" g="0" b="0"/>
+      </a:effectRef>
+      <a:fontRef idx="minor">
+        <a:schemeClr val="lt1"/>
+      </a:fontRef>
+    </dgm:style>
+  </dgm:styleLbl>
+  <dgm:styleLbl name="bgSibTrans2D1">
+    <dgm:scene3d>
+      <a:camera prst="orthographicFront"/>
+      <a:lightRig rig="threePt" dir="t"/>
+    </dgm:scene3d>
+    <dgm:sp3d/>
+    <dgm:txPr/>
+    <dgm:style>
+      <a:lnRef idx="0">
+        <a:scrgbClr r="0" g="0" b="0"/>
+      </a:lnRef>
+      <a:fillRef idx="3">
+        <a:scrgbClr r="0" g="0" b="0"/>
+      </a:fillRef>
+      <a:effectRef idx="3">
+        <a:scrgbClr r="0" g="0" b="0"/>
+      </a:effectRef>
+      <a:fontRef idx="minor">
+        <a:schemeClr val="lt1"/>
+      </a:fontRef>
+    </dgm:style>
+  </dgm:styleLbl>
+  <dgm:styleLbl name="sibTrans1D1">
+    <dgm:scene3d>
+      <a:camera prst="orthographicFront"/>
+      <a:lightRig rig="threePt" dir="t"/>
+    </dgm:scene3d>
+    <dgm:sp3d/>
+    <dgm:txPr/>
+    <dgm:style>
+      <a:lnRef idx="1">
+        <a:scrgbClr r="0" g="0" b="0"/>
+      </a:lnRef>
+      <a:fillRef idx="0">
+        <a:scrgbClr r="0" g="0" b="0"/>
+      </a:fillRef>
+      <a:effectRef idx="0">
+        <a:scrgbClr r="0" g="0" b="0"/>
+      </a:effectRef>
+      <a:fontRef idx="minor"/>
+    </dgm:style>
+  </dgm:styleLbl>
+  <dgm:styleLbl name="callout">
+    <dgm:scene3d>
+      <a:camera prst="orthographicFront"/>
+      <a:lightRig rig="threePt" dir="t"/>
+    </dgm:scene3d>
+    <dgm:sp3d/>
+    <dgm:txPr/>
+    <dgm:style>
+      <a:lnRef idx="1">
+        <a:scrgbClr r="0" g="0" b="0"/>
+      </a:lnRef>
+      <a:fillRef idx="0">
+        <a:scrgbClr r="0" g="0" b="0"/>
+      </a:fillRef>
+      <a:effectRef idx="1">
+        <a:scrgbClr r="0" g="0" b="0"/>
+      </a:effectRef>
+      <a:fontRef idx="minor"/>
+    </dgm:style>
+  </dgm:styleLbl>
+  <dgm:styleLbl name="asst0">
+    <dgm:scene3d>
+      <a:camera prst="orthographicFront"/>
+      <a:lightRig rig="threePt" dir="t"/>
+    </dgm:scene3d>
+    <dgm:sp3d/>
+    <dgm:txPr/>
+    <dgm:style>
+      <a:lnRef idx="0">
+        <a:scrgbClr r="0" g="0" b="0"/>
+      </a:lnRef>
+      <a:fillRef idx="3">
+        <a:scrgbClr r="0" g="0" b="0"/>
+      </a:fillRef>
+      <a:effectRef idx="3">
+        <a:scrgbClr r="0" g="0" b="0"/>
+      </a:effectRef>
+      <a:fontRef idx="minor">
+        <a:schemeClr val="lt1"/>
+      </a:fontRef>
+    </dgm:style>
+  </dgm:styleLbl>
+  <dgm:styleLbl name="asst1">
+    <dgm:scene3d>
+      <a:camera prst="orthographicFront"/>
+      <a:lightRig rig="threePt" dir="t"/>
+    </dgm:scene3d>
+    <dgm:sp3d/>
+    <dgm:txPr/>
+    <dgm:style>
+      <a:lnRef idx="0">
+        <a:scrgbClr r="0" g="0" b="0"/>
+      </a:lnRef>
+      <a:fillRef idx="3">
+        <a:scrgbClr r="0" g="0" b="0"/>
+      </a:fillRef>
+      <a:effectRef idx="3">
+        <a:scrgbClr r="0" g="0" b="0"/>
+      </a:effectRef>
+      <a:fontRef idx="minor">
+        <a:schemeClr val="lt1"/>
+      </a:fontRef>
+    </dgm:style>
+  </dgm:styleLbl>
+  <dgm:styleLbl name="asst2">
+    <dgm:scene3d>
+      <a:camera prst="orthographicFront"/>
+      <a:lightRig rig="threePt" dir="t"/>
+    </dgm:scene3d>
+    <dgm:sp3d/>
+    <dgm:txPr/>
+    <dgm:style>
+      <a:lnRef idx="0">
+        <a:scrgbClr r="0" g="0" b="0"/>
+      </a:lnRef>
+      <a:fillRef idx="3">
+        <a:scrgbClr r="0" g="0" b="0"/>
+      </a:fillRef>
+      <a:effectRef idx="3">
+        <a:scrgbClr r="0" g="0" b="0"/>
+      </a:effectRef>
+      <a:fontRef idx="minor">
+        <a:schemeClr val="lt1"/>
+      </a:fontRef>
+    </dgm:style>
+  </dgm:styleLbl>
+  <dgm:styleLbl name="asst3">
+    <dgm:scene3d>
+      <a:camera prst="orthographicFront"/>
+      <a:lightRig rig="threePt" dir="t"/>
+    </dgm:scene3d>
+    <dgm:sp3d/>
+    <dgm:txPr/>
+    <dgm:style>
+      <a:lnRef idx="0">
+        <a:scrgbClr r="0" g="0" b="0"/>
+      </a:lnRef>
+      <a:fillRef idx="3">
+        <a:scrgbClr r="0" g="0" b="0"/>
+      </a:fillRef>
+      <a:effectRef idx="3">
+        <a:scrgbClr r="0" g="0" b="0"/>
+      </a:effectRef>
+      <a:fontRef idx="minor">
+        <a:schemeClr val="lt1"/>
+      </a:fontRef>
+    </dgm:style>
+  </dgm:styleLbl>
+  <dgm:styleLbl name="asst4">
+    <dgm:scene3d>
+      <a:camera prst="orthographicFront"/>
+      <a:lightRig rig="threePt" dir="t"/>
+    </dgm:scene3d>
+    <dgm:sp3d/>
+    <dgm:txPr/>
+    <dgm:style>
+      <a:lnRef idx="0">
+        <a:scrgbClr r="0" g="0" b="0"/>
+      </a:lnRef>
+      <a:fillRef idx="3">
+        <a:scrgbClr r="0" g="0" b="0"/>
+      </a:fillRef>
+      <a:effectRef idx="3">
+        <a:scrgbClr r="0" g="0" b="0"/>
+      </a:effectRef>
+      <a:fontRef idx="minor">
+        <a:schemeClr val="lt1"/>
+      </a:fontRef>
+    </dgm:style>
+  </dgm:styleLbl>
+  <dgm:styleLbl name="parChTrans2D1">
+    <dgm:scene3d>
+      <a:camera prst="orthographicFront"/>
+      <a:lightRig rig="threePt" dir="t"/>
+    </dgm:scene3d>
+    <dgm:sp3d/>
+    <dgm:txPr/>
+    <dgm:style>
+      <a:lnRef idx="0">
+        <a:scrgbClr r="0" g="0" b="0"/>
+      </a:lnRef>
+      <a:fillRef idx="3">
+        <a:scrgbClr r="0" g="0" b="0"/>
+      </a:fillRef>
+      <a:effectRef idx="3">
+        <a:scrgbClr r="0" g="0" b="0"/>
+      </a:effectRef>
+      <a:fontRef idx="minor">
+        <a:schemeClr val="lt1"/>
+      </a:fontRef>
+    </dgm:style>
+  </dgm:styleLbl>
+  <dgm:styleLbl name="parChTrans2D2">
+    <dgm:scene3d>
+      <a:camera prst="orthographicFront"/>
+      <a:lightRig rig="threePt" dir="t"/>
+    </dgm:scene3d>
+    <dgm:sp3d/>
+    <dgm:txPr/>
+    <dgm:style>
+      <a:lnRef idx="0">
+        <a:scrgbClr r="0" g="0" b="0"/>
+      </a:lnRef>
+      <a:fillRef idx="3">
+        <a:scrgbClr r="0" g="0" b="0"/>
+      </a:fillRef>
+      <a:effectRef idx="3">
+        <a:scrgbClr r="0" g="0" b="0"/>
+      </a:effectRef>
+      <a:fontRef idx="minor">
+        <a:schemeClr val="lt1"/>
+      </a:fontRef>
+    </dgm:style>
+  </dgm:styleLbl>
+  <dgm:styleLbl name="parChTrans2D3">
+    <dgm:scene3d>
+      <a:camera prst="orthographicFront"/>
+      <a:lightRig rig="threePt" dir="t"/>
+    </dgm:scene3d>
+    <dgm:sp3d/>
+    <dgm:txPr/>
+    <dgm:style>
+      <a:lnRef idx="0">
+        <a:scrgbClr r="0" g="0" b="0"/>
+      </a:lnRef>
+      <a:fillRef idx="3">
+        <a:scrgbClr r="0" g="0" b="0"/>
+      </a:fillRef>
+      <a:effectRef idx="3">
+        <a:scrgbClr r="0" g="0" b="0"/>
+      </a:effectRef>
+      <a:fontRef idx="minor">
+        <a:schemeClr val="lt1"/>
+      </a:fontRef>
+    </dgm:style>
+  </dgm:styleLbl>
+  <dgm:styleLbl name="parChTrans2D4">
+    <dgm:scene3d>
+      <a:camera prst="orthographicFront"/>
+      <a:lightRig rig="threePt" dir="t"/>
+    </dgm:scene3d>
+    <dgm:sp3d/>
+    <dgm:txPr/>
+    <dgm:style>
+      <a:lnRef idx="0">
+        <a:scrgbClr r="0" g="0" b="0"/>
+      </a:lnRef>
+      <a:fillRef idx="3">
+        <a:scrgbClr r="0" g="0" b="0"/>
+      </a:fillRef>
+      <a:effectRef idx="3">
+        <a:scrgbClr r="0" g="0" b="0"/>
+      </a:effectRef>
+      <a:fontRef idx="minor">
+        <a:schemeClr val="lt1"/>
+      </a:fontRef>
+    </dgm:style>
+  </dgm:styleLbl>
+  <dgm:styleLbl name="parChTrans1D1">
+    <dgm:scene3d>
+      <a:camera prst="orthographicFront"/>
+      <a:lightRig rig="threePt" dir="t"/>
+    </dgm:scene3d>
+    <dgm:sp3d/>
+    <dgm:txPr/>
+    <dgm:style>
+      <a:lnRef idx="2">
+        <a:scrgbClr r="0" g="0" b="0"/>
+      </a:lnRef>
+      <a:fillRef idx="0">
+        <a:scrgbClr r="0" g="0" b="0"/>
+      </a:fillRef>
+      <a:effectRef idx="0">
+        <a:scrgbClr r="0" g="0" b="0"/>
+      </a:effectRef>
+      <a:fontRef idx="minor"/>
+    </dgm:style>
+  </dgm:styleLbl>
+  <dgm:styleLbl name="parChTrans1D2">
+    <dgm:scene3d>
+      <a:camera prst="orthographicFront"/>
+      <a:lightRig rig="threePt" dir="t"/>
+    </dgm:scene3d>
+    <dgm:sp3d/>
+    <dgm:txPr/>
+    <dgm:style>
+      <a:lnRef idx="2">
+        <a:scrgbClr r="0" g="0" b="0"/>
+      </a:lnRef>
+      <a:fillRef idx="0">
+        <a:scrgbClr r="0" g="0" b="0"/>
+      </a:fillRef>
+      <a:effectRef idx="0">
+        <a:scrgbClr r="0" g="0" b="0"/>
+      </a:effectRef>
+      <a:fontRef idx="minor"/>
+    </dgm:style>
+  </dgm:styleLbl>
+  <dgm:styleLbl name="parChTrans1D3">
+    <dgm:scene3d>
+      <a:camera prst="orthographicFront"/>
+      <a:lightRig rig="threePt" dir="t"/>
+    </dgm:scene3d>
+    <dgm:sp3d/>
+    <dgm:txPr/>
+    <dgm:style>
+      <a:lnRef idx="2">
+        <a:scrgbClr r="0" g="0" b="0"/>
+      </a:lnRef>
+      <a:fillRef idx="0">
+        <a:scrgbClr r="0" g="0" b="0"/>
+      </a:fillRef>
+      <a:effectRef idx="0">
+        <a:scrgbClr r="0" g="0" b="0"/>
+      </a:effectRef>
+      <a:fontRef idx="minor"/>
+    </dgm:style>
+  </dgm:styleLbl>
+  <dgm:styleLbl name="parChTrans1D4">
+    <dgm:scene3d>
+      <a:camera prst="orthographicFront"/>
+      <a:lightRig rig="threePt" dir="t"/>
+    </dgm:scene3d>
+    <dgm:sp3d/>
+    <dgm:txPr/>
+    <dgm:style>
+      <a:lnRef idx="2">
+        <a:scrgbClr r="0" g="0" b="0"/>
+      </a:lnRef>
+      <a:fillRef idx="0">
+        <a:scrgbClr r="0" g="0" b="0"/>
+      </a:fillRef>
+      <a:effectRef idx="0">
+        <a:scrgbClr r="0" g="0" b="0"/>
+      </a:effectRef>
+      <a:fontRef idx="minor"/>
+    </dgm:style>
+  </dgm:styleLbl>
+  <dgm:styleLbl name="fgAcc1">
+    <dgm:scene3d>
+      <a:camera prst="orthographicFront"/>
+      <a:lightRig rig="threePt" dir="t"/>
+    </dgm:scene3d>
+    <dgm:sp3d/>
+    <dgm:txPr/>
+    <dgm:style>
+      <a:lnRef idx="1">
+        <a:scrgbClr r="0" g="0" b="0"/>
+      </a:lnRef>
+      <a:fillRef idx="1">
+        <a:scrgbClr r="0" g="0" b="0"/>
+      </a:fillRef>
+      <a:effectRef idx="2">
+        <a:scrgbClr r="0" g="0" b="0"/>
+      </a:effectRef>
+      <a:fontRef idx="minor"/>
+    </dgm:style>
+  </dgm:styleLbl>
+  <dgm:styleLbl name="conFgAcc1">
+    <dgm:scene3d>
+      <a:camera prst="orthographicFront"/>
+      <a:lightRig rig="threePt" dir="t"/>
+    </dgm:scene3d>
+    <dgm:sp3d/>
+    <dgm:txPr/>
+    <dgm:style>
+      <a:lnRef idx="1">
+        <a:scrgbClr r="0" g="0" b="0"/>
+      </a:lnRef>
+      <a:fillRef idx="1">
+        <a:scrgbClr r="0" g="0" b="0"/>
+      </a:fillRef>
+      <a:effectRef idx="2">
+        <a:scrgbClr r="0" g="0" b="0"/>
+      </a:effectRef>
+      <a:fontRef idx="minor"/>
+    </dgm:style>
+  </dgm:styleLbl>
+  <dgm:styleLbl name="alignAcc1">
+    <dgm:scene3d>
+      <a:camera prst="orthographicFront"/>
+      <a:lightRig rig="threePt" dir="t"/>
+    </dgm:scene3d>
+    <dgm:sp3d/>
+    <dgm:txPr/>
+    <dgm:style>
+      <a:lnRef idx="1">
+        <a:scrgbClr r="0" g="0" b="0"/>
+      </a:lnRef>
+      <a:fillRef idx="1">
+        <a:scrgbClr r="0" g="0" b="0"/>
+      </a:fillRef>
+      <a:effectRef idx="2">
+        <a:scrgbClr r="0" g="0" b="0"/>
+      </a:effectRef>
+      <a:fontRef idx="minor"/>
+    </dgm:style>
+  </dgm:styleLbl>
+  <dgm:styleLbl name="trAlignAcc1">
+    <dgm:scene3d>
+      <a:camera prst="orthographicFront"/>
+      <a:lightRig rig="threePt" dir="t"/>
+    </dgm:scene3d>
+    <dgm:sp3d/>
+    <dgm:txPr/>
+    <dgm:style>
+      <a:lnRef idx="1">
+        <a:scrgbClr r="0" g="0" b="0"/>
+      </a:lnRef>
+      <a:fillRef idx="1">
+        <a:scrgbClr r="0" g="0" b="0"/>
+      </a:fillRef>
+      <a:effectRef idx="0">
+        <a:scrgbClr r="0" g="0" b="0"/>
+      </a:effectRef>
+      <a:fontRef idx="minor"/>
+    </dgm:style>
+  </dgm:styleLbl>
+  <dgm:styleLbl name="bgAcc1">
+    <dgm:scene3d>
+      <a:camera prst="orthographicFront"/>
+      <a:lightRig rig="threePt" dir="t"/>
+    </dgm:scene3d>
+    <dgm:sp3d/>
+    <dgm:txPr/>
+    <dgm:style>
+      <a:lnRef idx="1">
+        <a:scrgbClr r="0" g="0" b="0"/>
+      </a:lnRef>
+      <a:fillRef idx="1">
+        <a:scrgbClr r="0" g="0" b="0"/>
+      </a:fillRef>
+      <a:effectRef idx="2">
+        <a:scrgbClr r="0" g="0" b="0"/>
+      </a:effectRef>
+      <a:fontRef idx="minor"/>
+    </dgm:style>
+  </dgm:styleLbl>
+  <dgm:styleLbl name="solidFgAcc1">
+    <dgm:scene3d>
+      <a:camera prst="orthographicFront"/>
+      <a:lightRig rig="threePt" dir="t"/>
+    </dgm:scene3d>
+    <dgm:sp3d/>
+    <dgm:txPr/>
+    <dgm:style>
+      <a:lnRef idx="1">
+        <a:scrgbClr r="0" g="0" b="0"/>
+      </a:lnRef>
+      <a:fillRef idx="1">
+        <a:scrgbClr r="0" g="0" b="0"/>
+      </a:fillRef>
+      <a:effectRef idx="2">
+        <a:scrgbClr r="0" g="0" b="0"/>
+      </a:effectRef>
+      <a:fontRef idx="minor"/>
+    </dgm:style>
+  </dgm:styleLbl>
+  <dgm:styleLbl name="solidAlignAcc1">
+    <dgm:scene3d>
+      <a:camera prst="orthographicFront"/>
+      <a:lightRig rig="threePt" dir="t"/>
+    </dgm:scene3d>
+    <dgm:sp3d/>
+    <dgm:txPr/>
+    <dgm:style>
+      <a:lnRef idx="1">
+        <a:scrgbClr r="0" g="0" b="0"/>
+      </a:lnRef>
+      <a:fillRef idx="1">
+        <a:scrgbClr r="0" g="0" b="0"/>
+      </a:fillRef>
+      <a:effectRef idx="3">
+        <a:scrgbClr r="0" g="0" b="0"/>
+      </a:effectRef>
+      <a:fontRef idx="minor"/>
+    </dgm:style>
+  </dgm:styleLbl>
+  <dgm:styleLbl name="solidBgAcc1">
+    <dgm:scene3d>
+      <a:camera prst="orthographicFront"/>
+      <a:lightRig rig="threePt" dir="t"/>
+    </dgm:scene3d>
+    <dgm:sp3d/>
+    <dgm:txPr/>
+    <dgm:style>
+      <a:lnRef idx="1">
+        <a:scrgbClr r="0" g="0" b="0"/>
+      </a:lnRef>
+      <a:fillRef idx="1">
+        <a:scrgbClr r="0" g="0" b="0"/>
+      </a:fillRef>
+      <a:effectRef idx="3">
+        <a:scrgbClr r="0" g="0" b="0"/>
+      </a:effectRef>
+      <a:fontRef idx="minor"/>
+    </dgm:style>
+  </dgm:styleLbl>
+  <dgm:styleLbl name="fgAccFollowNode1">
+    <dgm:scene3d>
+      <a:camera prst="orthographicFront"/>
+      <a:lightRig rig="threePt" dir="t"/>
+    </dgm:scene3d>
+    <dgm:sp3d/>
+    <dgm:txPr/>
+    <dgm:style>
+      <a:lnRef idx="1">
+        <a:scrgbClr r="0" g="0" b="0"/>
+      </a:lnRef>
+      <a:fillRef idx="1">
+        <a:scrgbClr r="0" g="0" b="0"/>
+      </a:fillRef>
+      <a:effectRef idx="2">
+        <a:scrgbClr r="0" g="0" b="0"/>
+      </a:effectRef>
+      <a:fontRef idx="minor"/>
+    </dgm:style>
+  </dgm:styleLbl>
+  <dgm:styleLbl name="alignAccFollowNode1">
+    <dgm:scene3d>
+      <a:camera prst="orthographicFront"/>
+      <a:lightRig rig="threePt" dir="t"/>
+    </dgm:scene3d>
+    <dgm:sp3d/>
+    <dgm:txPr/>
+    <dgm:style>
+      <a:lnRef idx="1">
+        <a:scrgbClr r="0" g="0" b="0"/>
+      </a:lnRef>
+      <a:fillRef idx="1">
+        <a:scrgbClr r="0" g="0" b="0"/>
+      </a:fillRef>
+      <a:effectRef idx="2">
+        <a:scrgbClr r="0" g="0" b="0"/>
+      </a:effectRef>
+      <a:fontRef idx="minor"/>
+    </dgm:style>
+  </dgm:styleLbl>
+  <dgm:styleLbl name="bgAccFollowNode1">
+    <dgm:scene3d>
+      <a:camera prst="orthographicFront"/>
+      <a:lightRig rig="threePt" dir="t"/>
+    </dgm:scene3d>
+    <dgm:sp3d/>
+    <dgm:txPr/>
+    <dgm:style>
+      <a:lnRef idx="1">
+        <a:scrgbClr r="0" g="0" b="0"/>
+      </a:lnRef>
+      <a:fillRef idx="1">
+        <a:scrgbClr r="0" g="0" b="0"/>
+      </a:fillRef>
+      <a:effectRef idx="2">
+        <a:scrgbClr r="0" g="0" b="0"/>
+      </a:effectRef>
+      <a:fontRef idx="minor"/>
+    </dgm:style>
+  </dgm:styleLbl>
+  <dgm:styleLbl name="fgAcc0">
+    <dgm:scene3d>
+      <a:camera prst="orthographicFront"/>
+      <a:lightRig rig="threePt" dir="t"/>
+    </dgm:scene3d>
+    <dgm:sp3d/>
+    <dgm:txPr/>
+    <dgm:style>
+      <a:lnRef idx="1">
+        <a:scrgbClr r="0" g="0" b="0"/>
+      </a:lnRef>
+      <a:fillRef idx="1">
+        <a:scrgbClr r="0" g="0" b="0"/>
+      </a:fillRef>
+      <a:effectRef idx="2">
+        <a:scrgbClr r="0" g="0" b="0"/>
+      </a:effectRef>
+      <a:fontRef idx="minor"/>
+    </dgm:style>
+  </dgm:styleLbl>
+  <dgm:styleLbl name="fgAcc2">
+    <dgm:scene3d>
+      <a:camera prst="orthographicFront"/>
+      <a:lightRig rig="threePt" dir="t"/>
+    </dgm:scene3d>
+    <dgm:sp3d/>
+    <dgm:txPr/>
+    <dgm:style>
+      <a:lnRef idx="1">
+        <a:scrgbClr r="0" g="0" b="0"/>
+      </a:lnRef>
+      <a:fillRef idx="1">
+        <a:scrgbClr r="0" g="0" b="0"/>
+      </a:fillRef>
+      <a:effectRef idx="2">
+        <a:scrgbClr r="0" g="0" b="0"/>
+      </a:effectRef>
+      <a:fontRef idx="minor"/>
+    </dgm:style>
+  </dgm:styleLbl>
+  <dgm:styleLbl name="fgAcc3">
+    <dgm:scene3d>
+      <a:camera prst="orthographicFront"/>
+      <a:lightRig rig="threePt" dir="t"/>
+    </dgm:scene3d>
+    <dgm:sp3d/>
+    <dgm:txPr/>
+    <dgm:style>
+      <a:lnRef idx="1">
+        <a:scrgbClr r="0" g="0" b="0"/>
+      </a:lnRef>
+      <a:fillRef idx="1">
+        <a:scrgbClr r="0" g="0" b="0"/>
+      </a:fillRef>
+      <a:effectRef idx="2">
+        <a:scrgbClr r="0" g="0" b="0"/>
+      </a:effectRef>
+      <a:fontRef idx="minor"/>
+    </dgm:style>
+  </dgm:styleLbl>
+  <dgm:styleLbl name="fgAcc4">
+    <dgm:scene3d>
+      <a:camera prst="orthographicFront"/>
+      <a:lightRig rig="threePt" dir="t"/>
+    </dgm:scene3d>
+    <dgm:sp3d/>
+    <dgm:txPr/>
+    <dgm:style>
+      <a:lnRef idx="1">
+        <a:scrgbClr r="0" g="0" b="0"/>
+      </a:lnRef>
+      <a:fillRef idx="1">
+        <a:scrgbClr r="0" g="0" b="0"/>
+      </a:fillRef>
+      <a:effectRef idx="2">
+        <a:scrgbClr r="0" g="0" b="0"/>
+      </a:effectRef>
+      <a:fontRef idx="minor"/>
+    </dgm:style>
+  </dgm:styleLbl>
+  <dgm:styleLbl name="bgShp">
+    <dgm:scene3d>
+      <a:camera prst="orthographicFront"/>
+      <a:lightRig rig="threePt" dir="t"/>
+    </dgm:scene3d>
+    <dgm:sp3d/>
+    <dgm:txPr/>
+    <dgm:style>
+      <a:lnRef idx="0">
+        <a:scrgbClr r="0" g="0" b="0"/>
+      </a:lnRef>
+      <a:fillRef idx="1">
+        <a:scrgbClr r="0" g="0" b="0"/>
+      </a:fillRef>
+      <a:effectRef idx="2">
+        <a:scrgbClr r="0" g="0" b="0"/>
+      </a:effectRef>
+      <a:fontRef idx="minor"/>
+    </dgm:style>
+  </dgm:styleLbl>
+  <dgm:styleLbl name="dkBgShp">
+    <dgm:scene3d>
+      <a:camera prst="orthographicFront"/>
+      <a:lightRig rig="threePt" dir="t"/>
+    </dgm:scene3d>
+    <dgm:sp3d/>
+    <dgm:txPr/>
+    <dgm:style>
+      <a:lnRef idx="0">
+        <a:scrgbClr r="0" g="0" b="0"/>
+      </a:lnRef>
+      <a:fillRef idx="1">
+        <a:scrgbClr r="0" g="0" b="0"/>
+      </a:fillRef>
+      <a:effectRef idx="3">
+        <a:scrgbClr r="0" g="0" b="0"/>
+      </a:effectRef>
+      <a:fontRef idx="minor"/>
+    </dgm:style>
+  </dgm:styleLbl>
+  <dgm:styleLbl name="trBgShp">
+    <dgm:scene3d>
+      <a:camera prst="orthographicFront"/>
+      <a:lightRig rig="threePt" dir="t"/>
+    </dgm:scene3d>
+    <dgm:sp3d/>
+    <dgm:txPr/>
+    <dgm:style>
+      <a:lnRef idx="0">
+        <a:scrgbClr r="0" g="0" b="0"/>
+      </a:lnRef>
+      <a:fillRef idx="1">
+        <a:scrgbClr r="0" g="0" b="0"/>
+      </a:fillRef>
+      <a:effectRef idx="0">
+        <a:scrgbClr r="0" g="0" b="0"/>
+      </a:effectRef>
+      <a:fontRef idx="minor"/>
+    </dgm:style>
+  </dgm:styleLbl>
+  <dgm:styleLbl name="fgShp">
+    <dgm:scene3d>
+      <a:camera prst="orthographicFront"/>
+      <a:lightRig rig="threePt" dir="t"/>
+    </dgm:scene3d>
+    <dgm:sp3d/>
+    <dgm:txPr/>
+    <dgm:style>
+      <a:lnRef idx="0">
+        <a:scrgbClr r="0" g="0" b="0"/>
+      </a:lnRef>
+      <a:fillRef idx="3">
+        <a:scrgbClr r="0" g="0" b="0"/>
+      </a:fillRef>
+      <a:effectRef idx="3">
+        <a:scrgbClr r="0" g="0" b="0"/>
+      </a:effectRef>
+      <a:fontRef idx="minor"/>
+    </dgm:style>
+  </dgm:styleLbl>
+  <dgm:styleLbl name="revTx">
+    <dgm:scene3d>
+      <a:camera prst="orthographicFront"/>
+      <a:lightRig rig="threePt" dir="t"/>
+    </dgm:scene3d>
+    <dgm:sp3d/>
+    <dgm:txPr/>
+    <dgm:style>
+      <a:lnRef idx="0">
+        <a:scrgbClr r="0" g="0" b="0"/>
+      </a:lnRef>
+      <a:fillRef idx="0">
+        <a:scrgbClr r="0" g="0" b="0"/>
+      </a:fillRef>
+      <a:effectRef idx="0">
+        <a:scrgbClr r="0" g="0" b="0"/>
+      </a:effectRef>
+      <a:fontRef idx="minor"/>
+    </dgm:style>
+  </dgm:styleLbl>
+</dgm:styleDef>
+</file>
+
 <file path=ppt/slideLayouts/slideLayout1.xml><?xml version="1.0" encoding="utf-8"?>
 <p:sldLayout xmlns:a="http://schemas.openxmlformats.org/drawingml/2006/main" xmlns:r="http://schemas.openxmlformats.org/officeDocument/2006/relationships" xmlns:p="http://schemas.openxmlformats.org/presentationml/2006/main" type="title" preserve="1">
   <p:cSld name="Title Slide">
@@ -278,7 +2917,7 @@
           <a:p>
             <a:fld id="{E38922F9-7419-47F3-8C9B-D47FCFEDE078}" type="datetimeFigureOut">
               <a:rPr lang="en-IN" smtClean="0"/>
-              <a:t>17-01-2024</a:t>
+              <a:t>30-03-2024</a:t>
             </a:fld>
             <a:endParaRPr lang="en-IN"/>
           </a:p>
@@ -478,7 +3117,7 @@
           <a:p>
             <a:fld id="{E38922F9-7419-47F3-8C9B-D47FCFEDE078}" type="datetimeFigureOut">
               <a:rPr lang="en-IN" smtClean="0"/>
-              <a:t>17-01-2024</a:t>
+              <a:t>30-03-2024</a:t>
             </a:fld>
             <a:endParaRPr lang="en-IN"/>
           </a:p>
@@ -688,7 +3327,7 @@
           <a:p>
             <a:fld id="{E38922F9-7419-47F3-8C9B-D47FCFEDE078}" type="datetimeFigureOut">
               <a:rPr lang="en-IN" smtClean="0"/>
-              <a:t>17-01-2024</a:t>
+              <a:t>30-03-2024</a:t>
             </a:fld>
             <a:endParaRPr lang="en-IN"/>
           </a:p>
@@ -888,7 +3527,7 @@
           <a:p>
             <a:fld id="{E38922F9-7419-47F3-8C9B-D47FCFEDE078}" type="datetimeFigureOut">
               <a:rPr lang="en-IN" smtClean="0"/>
-              <a:t>17-01-2024</a:t>
+              <a:t>30-03-2024</a:t>
             </a:fld>
             <a:endParaRPr lang="en-IN"/>
           </a:p>
@@ -1164,7 +3803,7 @@
           <a:p>
             <a:fld id="{E38922F9-7419-47F3-8C9B-D47FCFEDE078}" type="datetimeFigureOut">
               <a:rPr lang="en-IN" smtClean="0"/>
-              <a:t>17-01-2024</a:t>
+              <a:t>30-03-2024</a:t>
             </a:fld>
             <a:endParaRPr lang="en-IN"/>
           </a:p>
@@ -1432,7 +4071,7 @@
           <a:p>
             <a:fld id="{E38922F9-7419-47F3-8C9B-D47FCFEDE078}" type="datetimeFigureOut">
               <a:rPr lang="en-IN" smtClean="0"/>
-              <a:t>17-01-2024</a:t>
+              <a:t>30-03-2024</a:t>
             </a:fld>
             <a:endParaRPr lang="en-IN"/>
           </a:p>
@@ -1847,7 +4486,7 @@
           <a:p>
             <a:fld id="{E38922F9-7419-47F3-8C9B-D47FCFEDE078}" type="datetimeFigureOut">
               <a:rPr lang="en-IN" smtClean="0"/>
-              <a:t>17-01-2024</a:t>
+              <a:t>30-03-2024</a:t>
             </a:fld>
             <a:endParaRPr lang="en-IN"/>
           </a:p>
@@ -1989,7 +4628,7 @@
           <a:p>
             <a:fld id="{E38922F9-7419-47F3-8C9B-D47FCFEDE078}" type="datetimeFigureOut">
               <a:rPr lang="en-IN" smtClean="0"/>
-              <a:t>17-01-2024</a:t>
+              <a:t>30-03-2024</a:t>
             </a:fld>
             <a:endParaRPr lang="en-IN"/>
           </a:p>
@@ -2102,7 +4741,7 @@
           <a:p>
             <a:fld id="{E38922F9-7419-47F3-8C9B-D47FCFEDE078}" type="datetimeFigureOut">
               <a:rPr lang="en-IN" smtClean="0"/>
-              <a:t>17-01-2024</a:t>
+              <a:t>30-03-2024</a:t>
             </a:fld>
             <a:endParaRPr lang="en-IN"/>
           </a:p>
@@ -2415,7 +5054,7 @@
           <a:p>
             <a:fld id="{E38922F9-7419-47F3-8C9B-D47FCFEDE078}" type="datetimeFigureOut">
               <a:rPr lang="en-IN" smtClean="0"/>
-              <a:t>17-01-2024</a:t>
+              <a:t>30-03-2024</a:t>
             </a:fld>
             <a:endParaRPr lang="en-IN"/>
           </a:p>
@@ -2704,7 +5343,7 @@
           <a:p>
             <a:fld id="{E38922F9-7419-47F3-8C9B-D47FCFEDE078}" type="datetimeFigureOut">
               <a:rPr lang="en-IN" smtClean="0"/>
-              <a:t>17-01-2024</a:t>
+              <a:t>30-03-2024</a:t>
             </a:fld>
             <a:endParaRPr lang="en-IN"/>
           </a:p>
@@ -2947,7 +5586,7 @@
           <a:p>
             <a:fld id="{E38922F9-7419-47F3-8C9B-D47FCFEDE078}" type="datetimeFigureOut">
               <a:rPr lang="en-IN" smtClean="0"/>
-              <a:t>17-01-2024</a:t>
+              <a:t>30-03-2024</a:t>
             </a:fld>
             <a:endParaRPr lang="en-IN"/>
           </a:p>
@@ -8382,6 +11021,108 @@
 </p:sld>
 </file>
 
+<file path=ppt/slides/slide19.xml><?xml version="1.0" encoding="utf-8"?>
+<p:sld xmlns:a="http://schemas.openxmlformats.org/drawingml/2006/main" xmlns:r="http://schemas.openxmlformats.org/officeDocument/2006/relationships" xmlns:p="http://schemas.openxmlformats.org/presentationml/2006/main">
+  <p:cSld>
+    <p:spTree>
+      <p:nvGrpSpPr>
+        <p:cNvPr id="1" name=""/>
+        <p:cNvGrpSpPr/>
+        <p:nvPr/>
+      </p:nvGrpSpPr>
+      <p:grpSpPr>
+        <a:xfrm>
+          <a:off x="0" y="0"/>
+          <a:ext cx="0" cy="0"/>
+          <a:chOff x="0" y="0"/>
+          <a:chExt cx="0" cy="0"/>
+        </a:xfrm>
+      </p:grpSpPr>
+      <p:sp>
+        <p:nvSpPr>
+          <p:cNvPr id="2" name="Title 1">
+            <a:extLst>
+              <a:ext uri="{FF2B5EF4-FFF2-40B4-BE49-F238E27FC236}">
+                <a16:creationId xmlns:a16="http://schemas.microsoft.com/office/drawing/2014/main" id="{9415B4F1-45CF-42D7-A971-3FA75D4A11A1}"/>
+              </a:ext>
+            </a:extLst>
+          </p:cNvPr>
+          <p:cNvSpPr>
+            <a:spLocks noGrp="1"/>
+          </p:cNvSpPr>
+          <p:nvPr>
+            <p:ph type="title"/>
+          </p:nvPr>
+        </p:nvSpPr>
+        <p:spPr/>
+        <p:txBody>
+          <a:bodyPr/>
+          <a:lstStyle/>
+          <a:p>
+            <a:r>
+              <a:rPr lang="en-US" dirty="0"/>
+              <a:t>Promise  </a:t>
+            </a:r>
+            <a:endParaRPr lang="en-IN" dirty="0"/>
+          </a:p>
+        </p:txBody>
+      </p:sp>
+      <p:sp>
+        <p:nvSpPr>
+          <p:cNvPr id="3" name="Content Placeholder 2">
+            <a:extLst>
+              <a:ext uri="{FF2B5EF4-FFF2-40B4-BE49-F238E27FC236}">
+                <a16:creationId xmlns:a16="http://schemas.microsoft.com/office/drawing/2014/main" id="{624E529D-DBEE-4822-86B2-15E4E0884154}"/>
+              </a:ext>
+            </a:extLst>
+          </p:cNvPr>
+          <p:cNvSpPr>
+            <a:spLocks noGrp="1"/>
+          </p:cNvSpPr>
+          <p:nvPr>
+            <p:ph idx="1"/>
+          </p:nvPr>
+        </p:nvSpPr>
+        <p:spPr/>
+        <p:txBody>
+          <a:bodyPr/>
+          <a:lstStyle/>
+          <a:p>
+            <a:r>
+              <a:rPr lang="en-US" dirty="0"/>
+              <a:t>Promise goes into Microtask Queue</a:t>
+            </a:r>
+          </a:p>
+          <a:p>
+            <a:r>
+              <a:rPr lang="en-US" dirty="0"/>
+              <a:t>Promise run before </a:t>
+            </a:r>
+            <a:r>
+              <a:rPr lang="en-US" dirty="0" err="1"/>
+              <a:t>setInterval</a:t>
+            </a:r>
+            <a:r>
+              <a:rPr lang="en-US" dirty="0"/>
+              <a:t>() callback</a:t>
+            </a:r>
+            <a:endParaRPr lang="en-IN" dirty="0"/>
+          </a:p>
+        </p:txBody>
+      </p:sp>
+    </p:spTree>
+    <p:extLst>
+      <p:ext uri="{BB962C8B-B14F-4D97-AF65-F5344CB8AC3E}">
+        <p14:creationId xmlns:p14="http://schemas.microsoft.com/office/powerpoint/2010/main" val="1947745590"/>
+      </p:ext>
+    </p:extLst>
+  </p:cSld>
+  <p:clrMapOvr>
+    <a:masterClrMapping/>
+  </p:clrMapOvr>
+</p:sld>
+</file>
+
 <file path=ppt/slides/slide2.xml><?xml version="1.0" encoding="utf-8"?>
 <p:sld xmlns:a="http://schemas.openxmlformats.org/drawingml/2006/main" xmlns:r="http://schemas.openxmlformats.org/officeDocument/2006/relationships" xmlns:p="http://schemas.openxmlformats.org/presentationml/2006/main">
   <p:cSld>
@@ -8457,6 +11198,433 @@
     <p:extLst>
       <p:ext uri="{BB962C8B-B14F-4D97-AF65-F5344CB8AC3E}">
         <p14:creationId xmlns:p14="http://schemas.microsoft.com/office/powerpoint/2010/main" val="3529509923"/>
+      </p:ext>
+    </p:extLst>
+  </p:cSld>
+  <p:clrMapOvr>
+    <a:masterClrMapping/>
+  </p:clrMapOvr>
+</p:sld>
+</file>
+
+<file path=ppt/slides/slide20.xml><?xml version="1.0" encoding="utf-8"?>
+<p:sld xmlns:a="http://schemas.openxmlformats.org/drawingml/2006/main" xmlns:r="http://schemas.openxmlformats.org/officeDocument/2006/relationships" xmlns:p="http://schemas.openxmlformats.org/presentationml/2006/main">
+  <p:cSld>
+    <p:spTree>
+      <p:nvGrpSpPr>
+        <p:cNvPr id="1" name=""/>
+        <p:cNvGrpSpPr/>
+        <p:nvPr/>
+      </p:nvGrpSpPr>
+      <p:grpSpPr>
+        <a:xfrm>
+          <a:off x="0" y="0"/>
+          <a:ext cx="0" cy="0"/>
+          <a:chOff x="0" y="0"/>
+          <a:chExt cx="0" cy="0"/>
+        </a:xfrm>
+      </p:grpSpPr>
+      <p:sp>
+        <p:nvSpPr>
+          <p:cNvPr id="7" name="Rectangle 6">
+            <a:extLst>
+              <a:ext uri="{FF2B5EF4-FFF2-40B4-BE49-F238E27FC236}">
+                <a16:creationId xmlns:a16="http://schemas.microsoft.com/office/drawing/2014/main" id="{76E105FD-78CF-44B0-96EC-ACE18292EEAC}"/>
+              </a:ext>
+            </a:extLst>
+          </p:cNvPr>
+          <p:cNvSpPr/>
+          <p:nvPr/>
+        </p:nvSpPr>
+        <p:spPr>
+          <a:xfrm>
+            <a:off x="2532184" y="942536"/>
+            <a:ext cx="8848578" cy="5915464"/>
+          </a:xfrm>
+          <a:prstGeom prst="rect">
+            <a:avLst/>
+          </a:prstGeom>
+        </p:spPr>
+        <p:style>
+          <a:lnRef idx="2">
+            <a:schemeClr val="accent1">
+              <a:shade val="50000"/>
+            </a:schemeClr>
+          </a:lnRef>
+          <a:fillRef idx="1">
+            <a:schemeClr val="accent1"/>
+          </a:fillRef>
+          <a:effectRef idx="0">
+            <a:schemeClr val="accent1"/>
+          </a:effectRef>
+          <a:fontRef idx="minor">
+            <a:schemeClr val="lt1"/>
+          </a:fontRef>
+        </p:style>
+        <p:txBody>
+          <a:bodyPr rtlCol="0" anchor="ctr"/>
+          <a:lstStyle/>
+          <a:p>
+            <a:pPr algn="ctr"/>
+            <a:endParaRPr lang="en-IN"/>
+          </a:p>
+        </p:txBody>
+      </p:sp>
+      <p:sp>
+        <p:nvSpPr>
+          <p:cNvPr id="8" name="Rectangle 7">
+            <a:extLst>
+              <a:ext uri="{FF2B5EF4-FFF2-40B4-BE49-F238E27FC236}">
+                <a16:creationId xmlns:a16="http://schemas.microsoft.com/office/drawing/2014/main" id="{D345D028-9116-4B81-AF65-7D200940903C}"/>
+              </a:ext>
+            </a:extLst>
+          </p:cNvPr>
+          <p:cNvSpPr/>
+          <p:nvPr/>
+        </p:nvSpPr>
+        <p:spPr>
+          <a:xfrm>
+            <a:off x="126609" y="2869809"/>
+            <a:ext cx="1997613" cy="3882683"/>
+          </a:xfrm>
+          <a:prstGeom prst="rect">
+            <a:avLst/>
+          </a:prstGeom>
+        </p:spPr>
+        <p:style>
+          <a:lnRef idx="2">
+            <a:schemeClr val="accent2">
+              <a:shade val="50000"/>
+            </a:schemeClr>
+          </a:lnRef>
+          <a:fillRef idx="1">
+            <a:schemeClr val="accent2"/>
+          </a:fillRef>
+          <a:effectRef idx="0">
+            <a:schemeClr val="accent2"/>
+          </a:effectRef>
+          <a:fontRef idx="minor">
+            <a:schemeClr val="lt1"/>
+          </a:fontRef>
+        </p:style>
+        <p:txBody>
+          <a:bodyPr rtlCol="0" anchor="ctr"/>
+          <a:lstStyle/>
+          <a:p>
+            <a:pPr algn="ctr"/>
+            <a:endParaRPr lang="en-IN" dirty="0"/>
+          </a:p>
+        </p:txBody>
+      </p:sp>
+      <p:graphicFrame>
+        <p:nvGraphicFramePr>
+          <p:cNvPr id="9" name="Diagram 8">
+            <a:extLst>
+              <a:ext uri="{FF2B5EF4-FFF2-40B4-BE49-F238E27FC236}">
+                <a16:creationId xmlns:a16="http://schemas.microsoft.com/office/drawing/2014/main" id="{B1FA9B80-623B-4E37-8B43-40E57EBE47DB}"/>
+              </a:ext>
+            </a:extLst>
+          </p:cNvPr>
+          <p:cNvGraphicFramePr/>
+          <p:nvPr>
+            <p:extLst>
+              <p:ext uri="{D42A27DB-BD31-4B8C-83A1-F6EECF244321}">
+                <p14:modId xmlns:p14="http://schemas.microsoft.com/office/powerpoint/2010/main" val="3792601892"/>
+              </p:ext>
+            </p:extLst>
+          </p:nvPr>
+        </p:nvGraphicFramePr>
+        <p:xfrm>
+          <a:off x="2433710" y="2290624"/>
+          <a:ext cx="2560321" cy="2014090"/>
+        </p:xfrm>
+        <a:graphic>
+          <a:graphicData uri="http://schemas.openxmlformats.org/drawingml/2006/diagram">
+            <dgm:relIds xmlns:dgm="http://schemas.openxmlformats.org/drawingml/2006/diagram" xmlns:r="http://schemas.openxmlformats.org/officeDocument/2006/relationships" r:dm="rId2" r:lo="rId3" r:qs="rId4" r:cs="rId5"/>
+          </a:graphicData>
+        </a:graphic>
+      </p:graphicFrame>
+      <p:sp>
+        <p:nvSpPr>
+          <p:cNvPr id="10" name="Rectangle 9">
+            <a:extLst>
+              <a:ext uri="{FF2B5EF4-FFF2-40B4-BE49-F238E27FC236}">
+                <a16:creationId xmlns:a16="http://schemas.microsoft.com/office/drawing/2014/main" id="{8ADFB44E-6F8B-4388-A98B-D4373807890D}"/>
+              </a:ext>
+            </a:extLst>
+          </p:cNvPr>
+          <p:cNvSpPr/>
+          <p:nvPr/>
+        </p:nvSpPr>
+        <p:spPr>
+          <a:xfrm>
+            <a:off x="2532184" y="4304714"/>
+            <a:ext cx="8848578" cy="1125415"/>
+          </a:xfrm>
+          <a:prstGeom prst="rect">
+            <a:avLst/>
+          </a:prstGeom>
+          <a:noFill/>
+          <a:ln w="9525" cap="flat" cmpd="sng" algn="ctr">
+            <a:solidFill>
+              <a:schemeClr val="accent4"/>
+            </a:solidFill>
+            <a:prstDash val="solid"/>
+            <a:round/>
+            <a:headEnd type="none" w="med" len="med"/>
+            <a:tailEnd type="none" w="med" len="med"/>
+          </a:ln>
+        </p:spPr>
+        <p:style>
+          <a:lnRef idx="0">
+            <a:scrgbClr r="0" g="0" b="0"/>
+          </a:lnRef>
+          <a:fillRef idx="0">
+            <a:scrgbClr r="0" g="0" b="0"/>
+          </a:fillRef>
+          <a:effectRef idx="0">
+            <a:scrgbClr r="0" g="0" b="0"/>
+          </a:effectRef>
+          <a:fontRef idx="minor">
+            <a:schemeClr val="accent4"/>
+          </a:fontRef>
+        </p:style>
+        <p:txBody>
+          <a:bodyPr rtlCol="0" anchor="ctr"/>
+          <a:lstStyle/>
+          <a:p>
+            <a:pPr algn="ctr"/>
+            <a:r>
+              <a:rPr lang="en-US" sz="3600" dirty="0"/>
+              <a:t>Callback</a:t>
+            </a:r>
+            <a:r>
+              <a:rPr lang="en-US" dirty="0"/>
+              <a:t>   </a:t>
+            </a:r>
+            <a:r>
+              <a:rPr lang="en-US" sz="3600" dirty="0"/>
+              <a:t>Queue</a:t>
+            </a:r>
+            <a:endParaRPr lang="en-IN" sz="3600" dirty="0"/>
+          </a:p>
+        </p:txBody>
+      </p:sp>
+      <p:sp>
+        <p:nvSpPr>
+          <p:cNvPr id="11" name="Rectangle 10">
+            <a:extLst>
+              <a:ext uri="{FF2B5EF4-FFF2-40B4-BE49-F238E27FC236}">
+                <a16:creationId xmlns:a16="http://schemas.microsoft.com/office/drawing/2014/main" id="{EF2DFB8D-1528-4366-AF00-EDB6541E8BC0}"/>
+              </a:ext>
+            </a:extLst>
+          </p:cNvPr>
+          <p:cNvSpPr/>
+          <p:nvPr/>
+        </p:nvSpPr>
+        <p:spPr>
+          <a:xfrm>
+            <a:off x="2532184" y="5581357"/>
+            <a:ext cx="8848578" cy="1125415"/>
+          </a:xfrm>
+          <a:prstGeom prst="rect">
+            <a:avLst/>
+          </a:prstGeom>
+        </p:spPr>
+        <p:style>
+          <a:lnRef idx="1">
+            <a:schemeClr val="accent6"/>
+          </a:lnRef>
+          <a:fillRef idx="3">
+            <a:schemeClr val="accent6"/>
+          </a:fillRef>
+          <a:effectRef idx="2">
+            <a:schemeClr val="accent6"/>
+          </a:effectRef>
+          <a:fontRef idx="minor">
+            <a:schemeClr val="lt1"/>
+          </a:fontRef>
+        </p:style>
+        <p:txBody>
+          <a:bodyPr rtlCol="0" anchor="ctr"/>
+          <a:lstStyle/>
+          <a:p>
+            <a:pPr algn="ctr"/>
+            <a:r>
+              <a:rPr lang="en-IN" sz="3600" dirty="0"/>
+              <a:t>Microtask Queue</a:t>
+            </a:r>
+          </a:p>
+        </p:txBody>
+      </p:sp>
+      <p:sp>
+        <p:nvSpPr>
+          <p:cNvPr id="12" name="TextBox 11">
+            <a:extLst>
+              <a:ext uri="{FF2B5EF4-FFF2-40B4-BE49-F238E27FC236}">
+                <a16:creationId xmlns:a16="http://schemas.microsoft.com/office/drawing/2014/main" id="{F29DABA3-A4B7-4078-B97E-E65C63D61D69}"/>
+              </a:ext>
+            </a:extLst>
+          </p:cNvPr>
+          <p:cNvSpPr txBox="1"/>
+          <p:nvPr/>
+        </p:nvSpPr>
+        <p:spPr>
+          <a:xfrm>
+            <a:off x="87923" y="2220353"/>
+            <a:ext cx="1955151" cy="646331"/>
+          </a:xfrm>
+          <a:prstGeom prst="rect">
+            <a:avLst/>
+          </a:prstGeom>
+          <a:noFill/>
+        </p:spPr>
+        <p:txBody>
+          <a:bodyPr wrap="none" rtlCol="0">
+            <a:spAutoFit/>
+          </a:bodyPr>
+          <a:lstStyle/>
+          <a:p>
+            <a:r>
+              <a:rPr lang="en-US" sz="3600" dirty="0"/>
+              <a:t>Call Stack</a:t>
+            </a:r>
+            <a:endParaRPr lang="en-IN" sz="3600" dirty="0"/>
+          </a:p>
+        </p:txBody>
+      </p:sp>
+      <p:sp>
+        <p:nvSpPr>
+          <p:cNvPr id="13" name="Rectangle: Rounded Corners 12">
+            <a:extLst>
+              <a:ext uri="{FF2B5EF4-FFF2-40B4-BE49-F238E27FC236}">
+                <a16:creationId xmlns:a16="http://schemas.microsoft.com/office/drawing/2014/main" id="{F4F92B1A-12A0-48F7-BDCD-B257DC77DF5F}"/>
+              </a:ext>
+            </a:extLst>
+          </p:cNvPr>
+          <p:cNvSpPr/>
+          <p:nvPr/>
+        </p:nvSpPr>
+        <p:spPr>
+          <a:xfrm>
+            <a:off x="8458200" y="1427871"/>
+            <a:ext cx="2560321" cy="1667021"/>
+          </a:xfrm>
+          <a:prstGeom prst="roundRect">
+            <a:avLst/>
+          </a:prstGeom>
+        </p:spPr>
+        <p:style>
+          <a:lnRef idx="0">
+            <a:schemeClr val="dk1"/>
+          </a:lnRef>
+          <a:fillRef idx="3">
+            <a:schemeClr val="dk1"/>
+          </a:fillRef>
+          <a:effectRef idx="3">
+            <a:schemeClr val="dk1"/>
+          </a:effectRef>
+          <a:fontRef idx="minor">
+            <a:schemeClr val="lt1"/>
+          </a:fontRef>
+        </p:style>
+        <p:txBody>
+          <a:bodyPr rtlCol="0" anchor="ctr"/>
+          <a:lstStyle/>
+          <a:p>
+            <a:pPr algn="ctr"/>
+            <a:r>
+              <a:rPr lang="en-US" sz="3600" dirty="0"/>
+              <a:t>Browser</a:t>
+            </a:r>
+            <a:endParaRPr lang="en-IN" sz="3600" dirty="0"/>
+          </a:p>
+        </p:txBody>
+      </p:sp>
+      <p:cxnSp>
+        <p:nvCxnSpPr>
+          <p:cNvPr id="15" name="Straight Arrow Connector 14">
+            <a:extLst>
+              <a:ext uri="{FF2B5EF4-FFF2-40B4-BE49-F238E27FC236}">
+                <a16:creationId xmlns:a16="http://schemas.microsoft.com/office/drawing/2014/main" id="{57A3387C-7F38-4B4B-A00C-539E063178A0}"/>
+              </a:ext>
+            </a:extLst>
+          </p:cNvPr>
+          <p:cNvCxnSpPr/>
+          <p:nvPr/>
+        </p:nvCxnSpPr>
+        <p:spPr>
+          <a:xfrm flipH="1">
+            <a:off x="8616462" y="3094892"/>
+            <a:ext cx="685800" cy="1600200"/>
+          </a:xfrm>
+          <a:prstGeom prst="straightConnector1">
+            <a:avLst/>
+          </a:prstGeom>
+          <a:ln>
+            <a:tailEnd type="triangle"/>
+          </a:ln>
+        </p:spPr>
+        <p:style>
+          <a:lnRef idx="1">
+            <a:schemeClr val="accent2"/>
+          </a:lnRef>
+          <a:fillRef idx="0">
+            <a:schemeClr val="accent2"/>
+          </a:fillRef>
+          <a:effectRef idx="0">
+            <a:schemeClr val="accent2"/>
+          </a:effectRef>
+          <a:fontRef idx="minor">
+            <a:schemeClr val="tx1"/>
+          </a:fontRef>
+        </p:style>
+      </p:cxnSp>
+      <p:cxnSp>
+        <p:nvCxnSpPr>
+          <p:cNvPr id="16" name="Straight Arrow Connector 15">
+            <a:extLst>
+              <a:ext uri="{FF2B5EF4-FFF2-40B4-BE49-F238E27FC236}">
+                <a16:creationId xmlns:a16="http://schemas.microsoft.com/office/drawing/2014/main" id="{A749F680-9D1A-4748-94D9-8E4DE1BAA57A}"/>
+              </a:ext>
+            </a:extLst>
+          </p:cNvPr>
+          <p:cNvCxnSpPr>
+            <a:cxnSpLocks/>
+          </p:cNvCxnSpPr>
+          <p:nvPr/>
+        </p:nvCxnSpPr>
+        <p:spPr>
+          <a:xfrm flipH="1">
+            <a:off x="8780585" y="2866684"/>
+            <a:ext cx="620151" cy="3266830"/>
+          </a:xfrm>
+          <a:prstGeom prst="straightConnector1">
+            <a:avLst/>
+          </a:prstGeom>
+          <a:ln>
+            <a:tailEnd type="triangle"/>
+          </a:ln>
+        </p:spPr>
+        <p:style>
+          <a:lnRef idx="1">
+            <a:schemeClr val="accent2"/>
+          </a:lnRef>
+          <a:fillRef idx="0">
+            <a:schemeClr val="accent2"/>
+          </a:fillRef>
+          <a:effectRef idx="0">
+            <a:schemeClr val="accent2"/>
+          </a:effectRef>
+          <a:fontRef idx="minor">
+            <a:schemeClr val="tx1"/>
+          </a:fontRef>
+        </p:style>
+      </p:cxnSp>
+    </p:spTree>
+    <p:extLst>
+      <p:ext uri="{BB962C8B-B14F-4D97-AF65-F5344CB8AC3E}">
+        <p14:creationId xmlns:p14="http://schemas.microsoft.com/office/powerpoint/2010/main" val="2487876186"/>
       </p:ext>
     </p:extLst>
   </p:cSld>

</xml_diff>